<commit_message>
[Presentation] added diagrammes and removed effects
</commit_message>
<xml_diff>
--- a/src/main/presentation/Zwischenpraesentation.pptx
+++ b/src/main/presentation/Zwischenpraesentation.pptx
@@ -5,10 +5,10 @@
     <p:sldMasterId id="2147483891" r:id="rId1"/>
   </p:sldMasterIdLst>
   <p:notesMasterIdLst>
-    <p:notesMasterId r:id="rId13"/>
+    <p:notesMasterId r:id="rId19"/>
   </p:notesMasterIdLst>
   <p:handoutMasterIdLst>
-    <p:handoutMasterId r:id="rId14"/>
+    <p:handoutMasterId r:id="rId20"/>
   </p:handoutMasterIdLst>
   <p:sldIdLst>
     <p:sldId id="256" r:id="rId2"/>
@@ -16,29 +16,35 @@
     <p:sldId id="269" r:id="rId4"/>
     <p:sldId id="257" r:id="rId5"/>
     <p:sldId id="270" r:id="rId6"/>
-    <p:sldId id="271" r:id="rId7"/>
-    <p:sldId id="273" r:id="rId8"/>
-    <p:sldId id="274" r:id="rId9"/>
-    <p:sldId id="275" r:id="rId10"/>
-    <p:sldId id="276" r:id="rId11"/>
-    <p:sldId id="277" r:id="rId12"/>
+    <p:sldId id="279" r:id="rId7"/>
+    <p:sldId id="280" r:id="rId8"/>
+    <p:sldId id="282" r:id="rId9"/>
+    <p:sldId id="271" r:id="rId10"/>
+    <p:sldId id="281" r:id="rId11"/>
+    <p:sldId id="283" r:id="rId12"/>
+    <p:sldId id="273" r:id="rId13"/>
+    <p:sldId id="274" r:id="rId14"/>
+    <p:sldId id="278" r:id="rId15"/>
+    <p:sldId id="275" r:id="rId16"/>
+    <p:sldId id="276" r:id="rId17"/>
+    <p:sldId id="277" r:id="rId18"/>
   </p:sldIdLst>
   <p:sldSz cx="12192000" cy="6858000"/>
   <p:notesSz cx="6858000" cy="9144000"/>
   <p:embeddedFontLst>
     <p:embeddedFont>
       <p:font typeface="Calibri" panose="020F0502020204030204" pitchFamily="34" charset="0"/>
-      <p:regular r:id="rId15"/>
-      <p:bold r:id="rId16"/>
-      <p:italic r:id="rId17"/>
-      <p:boldItalic r:id="rId18"/>
+      <p:regular r:id="rId21"/>
+      <p:bold r:id="rId22"/>
+      <p:italic r:id="rId23"/>
+      <p:boldItalic r:id="rId24"/>
     </p:embeddedFont>
     <p:embeddedFont>
       <p:font typeface="Open Sans" panose="020B0604020202020204" charset="0"/>
-      <p:regular r:id="rId19"/>
-      <p:bold r:id="rId20"/>
-      <p:italic r:id="rId21"/>
-      <p:boldItalic r:id="rId22"/>
+      <p:regular r:id="rId25"/>
+      <p:bold r:id="rId26"/>
+      <p:italic r:id="rId27"/>
+      <p:boldItalic r:id="rId28"/>
     </p:embeddedFont>
   </p:embeddedFontLst>
   <p:defaultTextStyle>
@@ -150,9 +156,15 @@
             <p14:sldId id="269"/>
             <p14:sldId id="257"/>
             <p14:sldId id="270"/>
+            <p14:sldId id="279"/>
+            <p14:sldId id="280"/>
+            <p14:sldId id="282"/>
             <p14:sldId id="271"/>
+            <p14:sldId id="281"/>
+            <p14:sldId id="283"/>
             <p14:sldId id="273"/>
             <p14:sldId id="274"/>
+            <p14:sldId id="278"/>
           </p14:sldIdLst>
         </p14:section>
         <p14:section name="Vorführung" id="{274ED286-D647-4C8E-BE4C-8F6AF0A391F0}">
@@ -4665,7 +4677,7 @@
           <a:p>
             <a:fld id="{C6AC6211-610F-44E5-BF19-D3CDF6EDD281}" type="datetimeFigureOut">
               <a:rPr lang="de-DE" smtClean="0"/>
-              <a:t>22.11.2018</a:t>
+              <a:t>25.11.2018</a:t>
             </a:fld>
             <a:endParaRPr lang="de-DE"/>
           </a:p>
@@ -4831,7 +4843,7 @@
           <a:p>
             <a:fld id="{347435D3-23A6-45D3-8DFA-7317DC1E7A64}" type="datetimeFigureOut">
               <a:rPr lang="de-DE" smtClean="0"/>
-              <a:t>22.11.2018</a:t>
+              <a:t>25.11.2018</a:t>
             </a:fld>
             <a:endParaRPr lang="de-DE"/>
           </a:p>
@@ -8157,502 +8169,10 @@
       </p:grpSpPr>
       <p:sp>
         <p:nvSpPr>
-          <p:cNvPr id="2" name="Titel 1"/>
-          <p:cNvSpPr>
-            <a:spLocks noGrp="1"/>
-          </p:cNvSpPr>
-          <p:nvPr>
-            <p:ph type="title"/>
-          </p:nvPr>
-        </p:nvSpPr>
-        <p:spPr/>
-        <p:txBody>
-          <a:bodyPr/>
-          <a:lstStyle/>
-          <a:p>
-            <a:pPr lvl="5"/>
-            <a:r>
-              <a:rPr lang="de-DE" sz="3600" b="1" dirty="0">
-                <a:solidFill>
-                  <a:schemeClr val="bg1"/>
-                </a:solidFill>
-                <a:latin typeface="+mj-lt"/>
-              </a:rPr>
-              <a:t>Diskussion</a:t>
-            </a:r>
-            <a:br>
-              <a:rPr lang="de-DE" sz="3600" b="1" dirty="0">
-                <a:solidFill>
-                  <a:schemeClr val="bg1"/>
-                </a:solidFill>
-                <a:latin typeface="+mj-lt"/>
-              </a:rPr>
-            </a:br>
-            <a:r>
-              <a:rPr lang="de-DE" sz="3600" dirty="0">
-                <a:solidFill>
-                  <a:schemeClr val="bg1"/>
-                </a:solidFill>
-                <a:latin typeface="+mj-lt"/>
-              </a:rPr>
-              <a:t>Fragen/ Anmerkungen ?</a:t>
-            </a:r>
-          </a:p>
-        </p:txBody>
-      </p:sp>
-    </p:spTree>
-    <p:custDataLst>
-      <p:tags r:id="rId1"/>
-    </p:custDataLst>
-    <p:extLst>
-      <p:ext uri="{BB962C8B-B14F-4D97-AF65-F5344CB8AC3E}">
-        <p14:creationId xmlns:p14="http://schemas.microsoft.com/office/powerpoint/2010/main" val="1909366443"/>
-      </p:ext>
-    </p:extLst>
-  </p:cSld>
-  <p:clrMapOvr>
-    <a:masterClrMapping/>
-  </p:clrMapOvr>
-</p:sld>
-</file>
-
-<file path=ppt/slides/slide11.xml><?xml version="1.0" encoding="utf-8"?>
-<p:sld xmlns:a="http://schemas.openxmlformats.org/drawingml/2006/main" xmlns:r="http://schemas.openxmlformats.org/officeDocument/2006/relationships" xmlns:p="http://schemas.openxmlformats.org/presentationml/2006/main">
-  <p:cSld>
-    <p:spTree>
-      <p:nvGrpSpPr>
-        <p:cNvPr id="1" name=""/>
-        <p:cNvGrpSpPr/>
-        <p:nvPr/>
-      </p:nvGrpSpPr>
-      <p:grpSpPr>
-        <a:xfrm>
-          <a:off x="0" y="0"/>
-          <a:ext cx="0" cy="0"/>
-          <a:chOff x="0" y="0"/>
-          <a:chExt cx="0" cy="0"/>
-        </a:xfrm>
-      </p:grpSpPr>
-      <p:sp>
-        <p:nvSpPr>
           <p:cNvPr id="2" name="Titel 1">
             <a:extLst>
               <a:ext uri="{FF2B5EF4-FFF2-40B4-BE49-F238E27FC236}">
-                <a16:creationId xmlns:a16="http://schemas.microsoft.com/office/drawing/2014/main" id="{610E12A8-9CCA-440E-92DF-89DE560850D4}"/>
-              </a:ext>
-            </a:extLst>
-          </p:cNvPr>
-          <p:cNvSpPr>
-            <a:spLocks noGrp="1"/>
-          </p:cNvSpPr>
-          <p:nvPr>
-            <p:ph type="title"/>
-          </p:nvPr>
-        </p:nvSpPr>
-        <p:spPr>
-          <a:xfrm>
-            <a:off x="805656" y="3136544"/>
-            <a:ext cx="10580687" cy="584912"/>
-          </a:xfrm>
-        </p:spPr>
-        <p:txBody>
-          <a:bodyPr/>
-          <a:lstStyle/>
-          <a:p>
-            <a:pPr algn="ctr"/>
-            <a:r>
-              <a:rPr lang="de-DE" dirty="0"/>
-              <a:t>Vielen Dank fürs Zuhören</a:t>
-            </a:r>
-          </a:p>
-        </p:txBody>
-      </p:sp>
-    </p:spTree>
-    <p:extLst>
-      <p:ext uri="{BB962C8B-B14F-4D97-AF65-F5344CB8AC3E}">
-        <p14:creationId xmlns:p14="http://schemas.microsoft.com/office/powerpoint/2010/main" val="779204632"/>
-      </p:ext>
-    </p:extLst>
-  </p:cSld>
-  <p:clrMapOvr>
-    <a:masterClrMapping/>
-  </p:clrMapOvr>
-</p:sld>
-</file>
-
-<file path=ppt/slides/slide2.xml><?xml version="1.0" encoding="utf-8"?>
-<p:sld xmlns:a="http://schemas.openxmlformats.org/drawingml/2006/main" xmlns:r="http://schemas.openxmlformats.org/officeDocument/2006/relationships" xmlns:p="http://schemas.openxmlformats.org/presentationml/2006/main">
-  <p:cSld>
-    <p:spTree>
-      <p:nvGrpSpPr>
-        <p:cNvPr id="1" name=""/>
-        <p:cNvGrpSpPr/>
-        <p:nvPr/>
-      </p:nvGrpSpPr>
-      <p:grpSpPr>
-        <a:xfrm>
-          <a:off x="0" y="0"/>
-          <a:ext cx="0" cy="0"/>
-          <a:chOff x="0" y="0"/>
-          <a:chExt cx="0" cy="0"/>
-        </a:xfrm>
-      </p:grpSpPr>
-      <p:sp>
-        <p:nvSpPr>
-          <p:cNvPr id="3" name="Titel 2"/>
-          <p:cNvSpPr>
-            <a:spLocks noGrp="1"/>
-          </p:cNvSpPr>
-          <p:nvPr>
-            <p:ph type="title"/>
-          </p:nvPr>
-        </p:nvSpPr>
-        <p:spPr/>
-        <p:txBody>
-          <a:bodyPr/>
-          <a:lstStyle/>
-          <a:p>
-            <a:r>
-              <a:rPr lang="de-DE" dirty="0"/>
-              <a:t>Inhalte</a:t>
-            </a:r>
-            <a:br>
-              <a:rPr lang="de-DE" dirty="0"/>
-            </a:br>
-            <a:r>
-              <a:rPr lang="de-DE" b="0" dirty="0"/>
-              <a:t>des Zwischenpräsentation</a:t>
-            </a:r>
-          </a:p>
-        </p:txBody>
-      </p:sp>
-      <p:sp>
-        <p:nvSpPr>
-          <p:cNvPr id="2" name="Inhaltsplatzhalter 1"/>
-          <p:cNvSpPr>
-            <a:spLocks noGrp="1"/>
-          </p:cNvSpPr>
-          <p:nvPr>
-            <p:ph sz="quarter" idx="10"/>
-          </p:nvPr>
-        </p:nvSpPr>
-        <p:spPr/>
-        <p:txBody>
-          <a:bodyPr/>
-          <a:lstStyle/>
-          <a:p>
-            <a:r>
-              <a:rPr lang="de-DE" b="1" dirty="0"/>
-              <a:t>Entwurfsentscheidungen </a:t>
-            </a:r>
-            <a:r>
-              <a:rPr lang="de-DE" dirty="0"/>
-              <a:t>im Projekt</a:t>
-            </a:r>
-          </a:p>
-          <a:p>
-            <a:pPr lvl="1"/>
-            <a:r>
-              <a:rPr lang="de-DE" dirty="0"/>
-              <a:t>Departments</a:t>
-            </a:r>
-          </a:p>
-          <a:p>
-            <a:pPr lvl="1"/>
-            <a:r>
-              <a:rPr lang="de-DE" dirty="0"/>
-              <a:t>Probleme &amp; Lösungsansätze</a:t>
-            </a:r>
-          </a:p>
-          <a:p>
-            <a:pPr marL="71989" lvl="1" indent="0">
-              <a:buNone/>
-            </a:pPr>
-            <a:endParaRPr lang="de-DE" dirty="0"/>
-          </a:p>
-          <a:p>
-            <a:r>
-              <a:rPr lang="de-DE" b="1" dirty="0"/>
-              <a:t>Vorführung </a:t>
-            </a:r>
-            <a:r>
-              <a:rPr lang="de-DE" dirty="0"/>
-              <a:t>der Software</a:t>
-            </a:r>
-          </a:p>
-          <a:p>
-            <a:pPr lvl="1"/>
-            <a:r>
-              <a:rPr lang="de-DE" dirty="0"/>
-              <a:t>Altes Layout</a:t>
-            </a:r>
-          </a:p>
-          <a:p>
-            <a:pPr lvl="1"/>
-            <a:r>
-              <a:rPr lang="de-DE" dirty="0"/>
-              <a:t>Neues Layout</a:t>
-            </a:r>
-          </a:p>
-          <a:p>
-            <a:pPr lvl="1"/>
-            <a:r>
-              <a:rPr lang="de-DE" dirty="0"/>
-              <a:t>2-3 Use Cases</a:t>
-            </a:r>
-          </a:p>
-          <a:p>
-            <a:pPr lvl="1"/>
-            <a:endParaRPr lang="de-DE" dirty="0"/>
-          </a:p>
-          <a:p>
-            <a:r>
-              <a:rPr lang="de-DE" b="1" dirty="0"/>
-              <a:t>Diskussion</a:t>
-            </a:r>
-          </a:p>
-        </p:txBody>
-      </p:sp>
-    </p:spTree>
-    <p:custDataLst>
-      <p:tags r:id="rId1"/>
-    </p:custDataLst>
-    <p:extLst>
-      <p:ext uri="{BB962C8B-B14F-4D97-AF65-F5344CB8AC3E}">
-        <p14:creationId xmlns:p14="http://schemas.microsoft.com/office/powerpoint/2010/main" val="296809162"/>
-      </p:ext>
-    </p:extLst>
-  </p:cSld>
-  <p:clrMapOvr>
-    <a:masterClrMapping/>
-  </p:clrMapOvr>
-</p:sld>
-</file>
-
-<file path=ppt/slides/slide3.xml><?xml version="1.0" encoding="utf-8"?>
-<p:sld xmlns:a="http://schemas.openxmlformats.org/drawingml/2006/main" xmlns:r="http://schemas.openxmlformats.org/officeDocument/2006/relationships" xmlns:p="http://schemas.openxmlformats.org/presentationml/2006/main">
-  <p:cSld>
-    <p:spTree>
-      <p:nvGrpSpPr>
-        <p:cNvPr id="1" name=""/>
-        <p:cNvGrpSpPr/>
-        <p:nvPr/>
-      </p:nvGrpSpPr>
-      <p:grpSpPr>
-        <a:xfrm>
-          <a:off x="0" y="0"/>
-          <a:ext cx="0" cy="0"/>
-          <a:chOff x="0" y="0"/>
-          <a:chExt cx="0" cy="0"/>
-        </a:xfrm>
-      </p:grpSpPr>
-      <p:sp>
-        <p:nvSpPr>
-          <p:cNvPr id="2" name="Titel 1"/>
-          <p:cNvSpPr>
-            <a:spLocks noGrp="1"/>
-          </p:cNvSpPr>
-          <p:nvPr>
-            <p:ph type="title"/>
-          </p:nvPr>
-        </p:nvSpPr>
-        <p:spPr/>
-        <p:txBody>
-          <a:bodyPr/>
-          <a:lstStyle/>
-          <a:p>
-            <a:pPr lvl="5"/>
-            <a:r>
-              <a:rPr lang="de-DE" sz="3600" b="1" dirty="0">
-                <a:solidFill>
-                  <a:schemeClr val="bg1"/>
-                </a:solidFill>
-                <a:latin typeface="+mj-lt"/>
-              </a:rPr>
-              <a:t>Entwurfsentscheidungen</a:t>
-            </a:r>
-            <a:br>
-              <a:rPr lang="de-DE" sz="3600" b="1" dirty="0">
-                <a:solidFill>
-                  <a:schemeClr val="bg1"/>
-                </a:solidFill>
-                <a:latin typeface="+mj-lt"/>
-              </a:rPr>
-            </a:br>
-            <a:r>
-              <a:rPr lang="de-DE" sz="3600" dirty="0">
-                <a:solidFill>
-                  <a:schemeClr val="bg1"/>
-                </a:solidFill>
-                <a:latin typeface="+mj-lt"/>
-              </a:rPr>
-              <a:t>im Projekt</a:t>
-            </a:r>
-          </a:p>
-        </p:txBody>
-      </p:sp>
-    </p:spTree>
-    <p:custDataLst>
-      <p:tags r:id="rId1"/>
-    </p:custDataLst>
-    <p:extLst>
-      <p:ext uri="{BB962C8B-B14F-4D97-AF65-F5344CB8AC3E}">
-        <p14:creationId xmlns:p14="http://schemas.microsoft.com/office/powerpoint/2010/main" val="1561740236"/>
-      </p:ext>
-    </p:extLst>
-  </p:cSld>
-  <p:clrMapOvr>
-    <a:masterClrMapping/>
-  </p:clrMapOvr>
-</p:sld>
-</file>
-
-<file path=ppt/slides/slide4.xml><?xml version="1.0" encoding="utf-8"?>
-<p:sld xmlns:a="http://schemas.openxmlformats.org/drawingml/2006/main" xmlns:r="http://schemas.openxmlformats.org/officeDocument/2006/relationships" xmlns:p="http://schemas.openxmlformats.org/presentationml/2006/main">
-  <p:cSld>
-    <p:spTree>
-      <p:nvGrpSpPr>
-        <p:cNvPr id="1" name=""/>
-        <p:cNvGrpSpPr/>
-        <p:nvPr/>
-      </p:nvGrpSpPr>
-      <p:grpSpPr>
-        <a:xfrm>
-          <a:off x="0" y="0"/>
-          <a:ext cx="0" cy="0"/>
-          <a:chOff x="0" y="0"/>
-          <a:chExt cx="0" cy="0"/>
-        </a:xfrm>
-      </p:grpSpPr>
-      <p:sp>
-        <p:nvSpPr>
-          <p:cNvPr id="3" name="Titel 2"/>
-          <p:cNvSpPr>
-            <a:spLocks noGrp="1"/>
-          </p:cNvSpPr>
-          <p:nvPr>
-            <p:ph type="title"/>
-          </p:nvPr>
-        </p:nvSpPr>
-        <p:spPr/>
-        <p:txBody>
-          <a:bodyPr/>
-          <a:lstStyle/>
-          <a:p>
-            <a:r>
-              <a:rPr lang="de-DE" dirty="0"/>
-              <a:t>Departments</a:t>
-            </a:r>
-            <a:endParaRPr lang="de-DE" b="0" dirty="0"/>
-          </a:p>
-        </p:txBody>
-      </p:sp>
-      <p:graphicFrame>
-        <p:nvGraphicFramePr>
-          <p:cNvPr id="11" name="Inhaltsplatzhalter 10">
-            <a:extLst>
-              <a:ext uri="{FF2B5EF4-FFF2-40B4-BE49-F238E27FC236}">
-                <a16:creationId xmlns:a16="http://schemas.microsoft.com/office/drawing/2014/main" id="{FEF4759C-AF07-4DD1-B53B-12FE904688CB}"/>
-              </a:ext>
-            </a:extLst>
-          </p:cNvPr>
-          <p:cNvGraphicFramePr>
-            <a:graphicFrameLocks noGrp="1"/>
-          </p:cNvGraphicFramePr>
-          <p:nvPr>
-            <p:ph sz="quarter" idx="10"/>
-            <p:extLst>
-              <p:ext uri="{D42A27DB-BD31-4B8C-83A1-F6EECF244321}">
-                <p14:modId xmlns:p14="http://schemas.microsoft.com/office/powerpoint/2010/main" val="2573639310"/>
-              </p:ext>
-            </p:extLst>
-          </p:nvPr>
-        </p:nvGraphicFramePr>
-        <p:xfrm>
-          <a:off x="874713" y="322324"/>
-          <a:ext cx="10580687" cy="5801507"/>
-        </p:xfrm>
-        <a:graphic>
-          <a:graphicData uri="http://schemas.openxmlformats.org/drawingml/2006/diagram">
-            <dgm:relIds xmlns:dgm="http://schemas.openxmlformats.org/drawingml/2006/diagram" xmlns:r="http://schemas.openxmlformats.org/officeDocument/2006/relationships" r:dm="rId3" r:lo="rId4" r:qs="rId5" r:cs="rId6"/>
-          </a:graphicData>
-        </a:graphic>
-      </p:graphicFrame>
-      <p:pic>
-        <p:nvPicPr>
-          <p:cNvPr id="13" name="Grafik 12">
-            <a:extLst>
-              <a:ext uri="{FF2B5EF4-FFF2-40B4-BE49-F238E27FC236}">
-                <a16:creationId xmlns:a16="http://schemas.microsoft.com/office/drawing/2014/main" id="{3AEA5AE6-C91F-4963-879E-482CFFD25E0F}"/>
-              </a:ext>
-            </a:extLst>
-          </p:cNvPr>
-          <p:cNvPicPr>
-            <a:picLocks noChangeAspect="1"/>
-          </p:cNvPicPr>
-          <p:nvPr/>
-        </p:nvPicPr>
-        <p:blipFill>
-          <a:blip r:embed="rId8" cstate="print">
-            <a:extLst>
-              <a:ext uri="{28A0092B-C50C-407E-A947-70E740481C1C}">
-                <a14:useLocalDpi xmlns:a14="http://schemas.microsoft.com/office/drawing/2010/main" val="0"/>
-              </a:ext>
-            </a:extLst>
-          </a:blip>
-          <a:stretch>
-            <a:fillRect/>
-          </a:stretch>
-        </p:blipFill>
-        <p:spPr>
-          <a:xfrm>
-            <a:off x="4954555" y="2207974"/>
-            <a:ext cx="2446989" cy="2224841"/>
-          </a:xfrm>
-          <a:prstGeom prst="rect">
-            <a:avLst/>
-          </a:prstGeom>
-        </p:spPr>
-      </p:pic>
-    </p:spTree>
-    <p:custDataLst>
-      <p:tags r:id="rId1"/>
-    </p:custDataLst>
-    <p:extLst>
-      <p:ext uri="{BB962C8B-B14F-4D97-AF65-F5344CB8AC3E}">
-        <p14:creationId xmlns:p14="http://schemas.microsoft.com/office/powerpoint/2010/main" val="195351814"/>
-      </p:ext>
-    </p:extLst>
-  </p:cSld>
-  <p:clrMapOvr>
-    <a:masterClrMapping/>
-  </p:clrMapOvr>
-</p:sld>
-</file>
-
-<file path=ppt/slides/slide5.xml><?xml version="1.0" encoding="utf-8"?>
-<p:sld xmlns:a="http://schemas.openxmlformats.org/drawingml/2006/main" xmlns:r="http://schemas.openxmlformats.org/officeDocument/2006/relationships" xmlns:p="http://schemas.openxmlformats.org/presentationml/2006/main">
-  <p:cSld>
-    <p:spTree>
-      <p:nvGrpSpPr>
-        <p:cNvPr id="1" name=""/>
-        <p:cNvGrpSpPr/>
-        <p:nvPr/>
-      </p:nvGrpSpPr>
-      <p:grpSpPr>
-        <a:xfrm>
-          <a:off x="0" y="0"/>
-          <a:ext cx="0" cy="0"/>
-          <a:chOff x="0" y="0"/>
-          <a:chExt cx="0" cy="0"/>
-        </a:xfrm>
-      </p:grpSpPr>
-      <p:sp>
-        <p:nvSpPr>
-          <p:cNvPr id="2" name="Titel 1">
-            <a:extLst>
-              <a:ext uri="{FF2B5EF4-FFF2-40B4-BE49-F238E27FC236}">
-                <a16:creationId xmlns:a16="http://schemas.microsoft.com/office/drawing/2014/main" id="{47A7BB8D-DB90-4C12-A26A-3E193428521D}"/>
+                <a16:creationId xmlns:a16="http://schemas.microsoft.com/office/drawing/2014/main" id="{9A412E5E-34B8-4161-B351-6932A0625BA2}"/>
               </a:ext>
             </a:extLst>
           </p:cNvPr>
@@ -8677,17 +8197,17 @@
             </a:br>
             <a:r>
               <a:rPr lang="de-DE" b="0" dirty="0"/>
-              <a:t>Problem 1</a:t>
+              <a:t>Problem 2</a:t>
             </a:r>
           </a:p>
         </p:txBody>
       </p:sp>
       <p:sp>
         <p:nvSpPr>
-          <p:cNvPr id="6" name="Inhaltsplatzhalter 5">
+          <p:cNvPr id="3" name="Inhaltsplatzhalter 2">
             <a:extLst>
               <a:ext uri="{FF2B5EF4-FFF2-40B4-BE49-F238E27FC236}">
-                <a16:creationId xmlns:a16="http://schemas.microsoft.com/office/drawing/2014/main" id="{2CBD6F4E-19E8-4ECD-A2F2-16B77AB2F32F}"/>
+                <a16:creationId xmlns:a16="http://schemas.microsoft.com/office/drawing/2014/main" id="{FCF4E8FF-213C-49C5-B5E4-86B00FF71ED0}"/>
               </a:ext>
             </a:extLst>
           </p:cNvPr>
@@ -8704,263 +8224,65 @@
           <a:lstStyle/>
           <a:p>
             <a:r>
-              <a:rPr lang="de-DE" u="sng" dirty="0"/>
-              <a:t>Aufgabenstellung:</a:t>
-            </a:r>
-          </a:p>
-          <a:p>
-            <a:pPr marL="285750" indent="-285750">
-              <a:buFont typeface="Arial" panose="020B0604020202020204" pitchFamily="34" charset="0"/>
-              <a:buChar char="•"/>
-            </a:pPr>
-            <a:r>
               <a:rPr lang="de-DE" dirty="0"/>
-              <a:t>Großhändlerproduktdatenbank kann bis zu 10.000 Artikel enthalten</a:t>
-            </a:r>
-          </a:p>
-          <a:p>
-            <a:pPr marL="285750" indent="-285750">
-              <a:buFont typeface="Arial" panose="020B0604020202020204" pitchFamily="34" charset="0"/>
-              <a:buChar char="•"/>
-            </a:pPr>
-            <a:r>
-              <a:rPr lang="de-DE" dirty="0"/>
-              <a:t>Angebotene Produktdatenbank kann maximal 999 Artikel beinhalten</a:t>
-            </a:r>
-          </a:p>
-          <a:p>
-            <a:pPr marL="285750" indent="-285750">
-              <a:buFont typeface="Arial" panose="020B0604020202020204" pitchFamily="34" charset="0"/>
-              <a:buChar char="•"/>
-            </a:pPr>
-            <a:endParaRPr lang="de-DE" dirty="0"/>
-          </a:p>
-          <a:p>
-            <a:r>
-              <a:rPr lang="de-DE" u="sng" dirty="0"/>
-              <a:t>Lösungsansätze:</a:t>
-            </a:r>
-          </a:p>
-          <a:p>
-            <a:pPr marL="342900" indent="-342900">
-              <a:buFont typeface="+mj-lt"/>
-              <a:buAutoNum type="arabicPeriod"/>
-            </a:pPr>
-            <a:r>
-              <a:rPr lang="de-DE" u="sng" dirty="0"/>
-              <a:t>eine</a:t>
-            </a:r>
-            <a:r>
-              <a:rPr lang="de-DE" dirty="0"/>
-              <a:t> Datenbank (Großhändlerproduktdatenbank) mit </a:t>
-            </a:r>
-            <a:r>
-              <a:rPr lang="de-DE" dirty="0" err="1"/>
-              <a:t>boolean</a:t>
-            </a:r>
-            <a:r>
-              <a:rPr lang="de-DE" dirty="0"/>
-              <a:t> Wert</a:t>
-            </a:r>
-          </a:p>
-          <a:p>
-            <a:pPr marL="342900" indent="-342900">
-              <a:buFont typeface="+mj-lt"/>
-              <a:buAutoNum type="arabicPeriod"/>
-            </a:pPr>
-            <a:r>
-              <a:rPr lang="de-DE" u="sng" dirty="0"/>
-              <a:t>zwei</a:t>
-            </a:r>
-            <a:r>
-              <a:rPr lang="de-DE" dirty="0"/>
-              <a:t> Datenbanken (Großhändlerprodukte und angebotene Produkte getrennt)</a:t>
+              <a:t>Vereinfachtes Klassendiagramm</a:t>
             </a:r>
           </a:p>
         </p:txBody>
       </p:sp>
-      <p:cxnSp>
-        <p:nvCxnSpPr>
-          <p:cNvPr id="8" name="Gerader Verbinder 7">
+      <p:pic>
+        <p:nvPicPr>
+          <p:cNvPr id="5" name="Grafik 4">
             <a:extLst>
               <a:ext uri="{FF2B5EF4-FFF2-40B4-BE49-F238E27FC236}">
-                <a16:creationId xmlns:a16="http://schemas.microsoft.com/office/drawing/2014/main" id="{8F2B85BD-2B02-4D70-808A-9963B2411068}"/>
+                <a16:creationId xmlns:a16="http://schemas.microsoft.com/office/drawing/2014/main" id="{D0725613-427B-469A-BED1-6C85E8BB1CCC}"/>
               </a:ext>
             </a:extLst>
           </p:cNvPr>
-          <p:cNvCxnSpPr>
-            <a:cxnSpLocks/>
-          </p:cNvCxnSpPr>
+          <p:cNvPicPr>
+            <a:picLocks noChangeAspect="1"/>
+          </p:cNvPicPr>
           <p:nvPr/>
-        </p:nvCxnSpPr>
+        </p:nvPicPr>
+        <p:blipFill>
+          <a:blip r:embed="rId2">
+            <a:extLst>
+              <a:ext uri="{28A0092B-C50C-407E-A947-70E740481C1C}">
+                <a14:useLocalDpi xmlns:a14="http://schemas.microsoft.com/office/drawing/2010/main" val="0"/>
+              </a:ext>
+              <a:ext uri="{96DAC541-7B7A-43D3-8B79-37D633B846F1}">
+                <asvg:svgBlip xmlns:asvg="http://schemas.microsoft.com/office/drawing/2016/SVG/main" r:embed="rId3"/>
+              </a:ext>
+            </a:extLst>
+          </a:blip>
+          <a:stretch>
+            <a:fillRect/>
+          </a:stretch>
+        </p:blipFill>
         <p:spPr>
           <a:xfrm>
-            <a:off x="874711" y="3600821"/>
-            <a:ext cx="6840000" cy="0"/>
+            <a:off x="0" y="874415"/>
+            <a:ext cx="12192000" cy="5109170"/>
           </a:xfrm>
-          <a:prstGeom prst="line">
+          <a:prstGeom prst="rect">
             <a:avLst/>
           </a:prstGeom>
-          <a:ln w="22225"/>
         </p:spPr>
-        <p:style>
-          <a:lnRef idx="1">
-            <a:schemeClr val="accent5"/>
-          </a:lnRef>
-          <a:fillRef idx="0">
-            <a:schemeClr val="accent5"/>
-          </a:fillRef>
-          <a:effectRef idx="0">
-            <a:schemeClr val="accent5"/>
-          </a:effectRef>
-          <a:fontRef idx="minor">
-            <a:schemeClr val="tx1"/>
-          </a:fontRef>
-        </p:style>
-      </p:cxnSp>
+      </p:pic>
     </p:spTree>
     <p:extLst>
       <p:ext uri="{BB962C8B-B14F-4D97-AF65-F5344CB8AC3E}">
-        <p14:creationId xmlns:p14="http://schemas.microsoft.com/office/powerpoint/2010/main" val="4024101338"/>
+        <p14:creationId xmlns:p14="http://schemas.microsoft.com/office/powerpoint/2010/main" val="2346373626"/>
       </p:ext>
     </p:extLst>
   </p:cSld>
   <p:clrMapOvr>
     <a:masterClrMapping/>
   </p:clrMapOvr>
-  <p:timing>
-    <p:tnLst>
-      <p:par>
-        <p:cTn id="1" dur="indefinite" restart="never" nodeType="tmRoot">
-          <p:childTnLst>
-            <p:seq concurrent="1" nextAc="seek">
-              <p:cTn id="2" dur="indefinite" nodeType="mainSeq">
-                <p:childTnLst>
-                  <p:par>
-                    <p:cTn id="3" fill="hold">
-                      <p:stCondLst>
-                        <p:cond delay="indefinite"/>
-                      </p:stCondLst>
-                      <p:childTnLst>
-                        <p:par>
-                          <p:cTn id="4" fill="hold">
-                            <p:stCondLst>
-                              <p:cond delay="0"/>
-                            </p:stCondLst>
-                            <p:childTnLst>
-                              <p:par>
-                                <p:cTn id="5" presetID="53" presetClass="entr" presetSubtype="16" fill="hold" nodeType="clickEffect">
-                                  <p:stCondLst>
-                                    <p:cond delay="0"/>
-                                  </p:stCondLst>
-                                  <p:childTnLst>
-                                    <p:set>
-                                      <p:cBhvr>
-                                        <p:cTn id="6" dur="1" fill="hold">
-                                          <p:stCondLst>
-                                            <p:cond delay="0"/>
-                                          </p:stCondLst>
-                                        </p:cTn>
-                                        <p:tgtEl>
-                                          <p:spTgt spid="8"/>
-                                        </p:tgtEl>
-                                        <p:attrNameLst>
-                                          <p:attrName>style.visibility</p:attrName>
-                                        </p:attrNameLst>
-                                      </p:cBhvr>
-                                      <p:to>
-                                        <p:strVal val="visible"/>
-                                      </p:to>
-                                    </p:set>
-                                    <p:anim calcmode="lin" valueType="num">
-                                      <p:cBhvr>
-                                        <p:cTn id="7" dur="500" fill="hold"/>
-                                        <p:tgtEl>
-                                          <p:spTgt spid="8"/>
-                                        </p:tgtEl>
-                                        <p:attrNameLst>
-                                          <p:attrName>ppt_w</p:attrName>
-                                        </p:attrNameLst>
-                                      </p:cBhvr>
-                                      <p:tavLst>
-                                        <p:tav tm="0">
-                                          <p:val>
-                                            <p:fltVal val="0"/>
-                                          </p:val>
-                                        </p:tav>
-                                        <p:tav tm="100000">
-                                          <p:val>
-                                            <p:strVal val="#ppt_w"/>
-                                          </p:val>
-                                        </p:tav>
-                                      </p:tavLst>
-                                    </p:anim>
-                                    <p:anim calcmode="lin" valueType="num">
-                                      <p:cBhvr>
-                                        <p:cTn id="8" dur="500" fill="hold"/>
-                                        <p:tgtEl>
-                                          <p:spTgt spid="8"/>
-                                        </p:tgtEl>
-                                        <p:attrNameLst>
-                                          <p:attrName>ppt_h</p:attrName>
-                                        </p:attrNameLst>
-                                      </p:cBhvr>
-                                      <p:tavLst>
-                                        <p:tav tm="0">
-                                          <p:val>
-                                            <p:fltVal val="0"/>
-                                          </p:val>
-                                        </p:tav>
-                                        <p:tav tm="100000">
-                                          <p:val>
-                                            <p:strVal val="#ppt_h"/>
-                                          </p:val>
-                                        </p:tav>
-                                      </p:tavLst>
-                                    </p:anim>
-                                    <p:animEffect transition="in" filter="fade">
-                                      <p:cBhvr>
-                                        <p:cTn id="9" dur="500"/>
-                                        <p:tgtEl>
-                                          <p:spTgt spid="8"/>
-                                        </p:tgtEl>
-                                      </p:cBhvr>
-                                    </p:animEffect>
-                                  </p:childTnLst>
-                                </p:cTn>
-                              </p:par>
-                            </p:childTnLst>
-                          </p:cTn>
-                        </p:par>
-                      </p:childTnLst>
-                    </p:cTn>
-                  </p:par>
-                </p:childTnLst>
-              </p:cTn>
-              <p:prevCondLst>
-                <p:cond evt="onPrev" delay="0">
-                  <p:tgtEl>
-                    <p:sldTgt/>
-                  </p:tgtEl>
-                </p:cond>
-              </p:prevCondLst>
-              <p:nextCondLst>
-                <p:cond evt="onNext" delay="0">
-                  <p:tgtEl>
-                    <p:sldTgt/>
-                  </p:tgtEl>
-                </p:cond>
-              </p:nextCondLst>
-            </p:seq>
-          </p:childTnLst>
-        </p:cTn>
-      </p:par>
-    </p:tnLst>
-  </p:timing>
 </p:sld>
 </file>
 
-<file path=ppt/slides/slide6.xml><?xml version="1.0" encoding="utf-8"?>
+<file path=ppt/slides/slide11.xml><?xml version="1.0" encoding="utf-8"?>
 <p:sld xmlns:a="http://schemas.openxmlformats.org/drawingml/2006/main" xmlns:r="http://schemas.openxmlformats.org/officeDocument/2006/relationships" xmlns:p="http://schemas.openxmlformats.org/presentationml/2006/main">
   <p:cSld>
     <p:spTree>
@@ -9034,68 +8356,271 @@
           <a:lstStyle/>
           <a:p>
             <a:r>
-              <a:rPr lang="de-DE" u="sng" dirty="0"/>
-              <a:t>Aufgabenstellung:</a:t>
-            </a:r>
-          </a:p>
-          <a:p>
-            <a:pPr marL="285750" indent="-285750">
-              <a:buFont typeface="Arial" panose="020B0604020202020204" pitchFamily="34" charset="0"/>
-              <a:buChar char="•"/>
-            </a:pPr>
-            <a:r>
               <a:rPr lang="de-DE" dirty="0"/>
-              <a:t>Kunden sollen keine Login-Daten besitzen (nur Personal und Manager)</a:t>
-            </a:r>
-          </a:p>
-          <a:p>
-            <a:pPr marL="285750" indent="-285750">
-              <a:buFont typeface="Arial" panose="020B0604020202020204" pitchFamily="34" charset="0"/>
-              <a:buChar char="•"/>
-            </a:pPr>
-            <a:r>
-              <a:rPr lang="de-DE" dirty="0"/>
-              <a:t>Manager und Personal besitzen unterschiedliche Zugriffe</a:t>
-            </a:r>
-          </a:p>
-          <a:p>
-            <a:endParaRPr lang="de-DE" dirty="0"/>
-          </a:p>
-          <a:p>
-            <a:r>
-              <a:rPr lang="de-DE" u="sng" dirty="0"/>
-              <a:t>Lösungsansatz:</a:t>
-            </a:r>
-          </a:p>
-          <a:p>
-            <a:pPr marL="285750" indent="-285750">
-              <a:buFont typeface="Arial" panose="020B0604020202020204" pitchFamily="34" charset="0"/>
-              <a:buChar char="•"/>
-            </a:pPr>
-            <a:r>
-              <a:rPr lang="de-DE" dirty="0"/>
-              <a:t>Customer und User werden getrennt </a:t>
-            </a:r>
-          </a:p>
-          <a:p>
-            <a:pPr marL="285750" indent="-285750">
-              <a:buFont typeface="Arial" panose="020B0604020202020204" pitchFamily="34" charset="0"/>
-              <a:buChar char="•"/>
-            </a:pPr>
-            <a:r>
-              <a:rPr lang="de-DE" dirty="0"/>
-              <a:t>User bekommen Rollen für Permission System</a:t>
-            </a:r>
-          </a:p>
-          <a:p>
-            <a:endParaRPr lang="de-DE" dirty="0"/>
+              <a:t>Vereinfachtes Klassendiagramm</a:t>
+            </a:r>
+          </a:p>
+        </p:txBody>
+      </p:sp>
+      <p:pic>
+        <p:nvPicPr>
+          <p:cNvPr id="5" name="Grafik 4">
+            <a:extLst>
+              <a:ext uri="{FF2B5EF4-FFF2-40B4-BE49-F238E27FC236}">
+                <a16:creationId xmlns:a16="http://schemas.microsoft.com/office/drawing/2014/main" id="{D0725613-427B-469A-BED1-6C85E8BB1CCC}"/>
+              </a:ext>
+            </a:extLst>
+          </p:cNvPr>
+          <p:cNvPicPr>
+            <a:picLocks noChangeAspect="1"/>
+          </p:cNvPicPr>
+          <p:nvPr/>
+        </p:nvPicPr>
+        <p:blipFill>
+          <a:blip r:embed="rId2">
+            <a:extLst>
+              <a:ext uri="{28A0092B-C50C-407E-A947-70E740481C1C}">
+                <a14:useLocalDpi xmlns:a14="http://schemas.microsoft.com/office/drawing/2010/main" val="0"/>
+              </a:ext>
+              <a:ext uri="{96DAC541-7B7A-43D3-8B79-37D633B846F1}">
+                <asvg:svgBlip xmlns:asvg="http://schemas.microsoft.com/office/drawing/2016/SVG/main" r:embed="rId3"/>
+              </a:ext>
+            </a:extLst>
+          </a:blip>
+          <a:stretch>
+            <a:fillRect/>
+          </a:stretch>
+        </p:blipFill>
+        <p:spPr>
+          <a:xfrm>
+            <a:off x="0" y="874415"/>
+            <a:ext cx="12192000" cy="5109170"/>
+          </a:xfrm>
+          <a:prstGeom prst="rect">
+            <a:avLst/>
+          </a:prstGeom>
+        </p:spPr>
+      </p:pic>
+      <p:sp>
+        <p:nvSpPr>
+          <p:cNvPr id="6" name="Rechteck: abgerundete Ecken 5">
+            <a:extLst>
+              <a:ext uri="{FF2B5EF4-FFF2-40B4-BE49-F238E27FC236}">
+                <a16:creationId xmlns:a16="http://schemas.microsoft.com/office/drawing/2014/main" id="{096EE6C1-D1D0-4B5D-86C7-3ADB68A3CC7F}"/>
+              </a:ext>
+            </a:extLst>
+          </p:cNvPr>
+          <p:cNvSpPr/>
+          <p:nvPr/>
+        </p:nvSpPr>
+        <p:spPr>
+          <a:xfrm>
+            <a:off x="11049712" y="2683379"/>
+            <a:ext cx="991312" cy="684213"/>
+          </a:xfrm>
+          <a:prstGeom prst="roundRect">
+            <a:avLst/>
+          </a:prstGeom>
+          <a:noFill/>
+          <a:ln w="38100" cap="flat" cmpd="sng" algn="ctr">
+            <a:solidFill>
+              <a:schemeClr val="accent5"/>
+            </a:solidFill>
+            <a:prstDash val="solid"/>
+            <a:round/>
+            <a:headEnd type="none" w="med" len="med"/>
+            <a:tailEnd type="none" w="med" len="med"/>
+          </a:ln>
+        </p:spPr>
+        <p:style>
+          <a:lnRef idx="0">
+            <a:scrgbClr r="0" g="0" b="0"/>
+          </a:lnRef>
+          <a:fillRef idx="0">
+            <a:scrgbClr r="0" g="0" b="0"/>
+          </a:fillRef>
+          <a:effectRef idx="0">
+            <a:scrgbClr r="0" g="0" b="0"/>
+          </a:effectRef>
+          <a:fontRef idx="minor">
+            <a:schemeClr val="accent5"/>
+          </a:fontRef>
+        </p:style>
+        <p:txBody>
+          <a:bodyPr rtlCol="0" anchor="ctr"/>
+          <a:lstStyle/>
+          <a:p>
+            <a:pPr algn="ctr"/>
+            <a:endParaRPr lang="de-DE"/>
+          </a:p>
+        </p:txBody>
+      </p:sp>
+      <p:sp>
+        <p:nvSpPr>
+          <p:cNvPr id="7" name="Rechteck: abgerundete Ecken 6">
+            <a:extLst>
+              <a:ext uri="{FF2B5EF4-FFF2-40B4-BE49-F238E27FC236}">
+                <a16:creationId xmlns:a16="http://schemas.microsoft.com/office/drawing/2014/main" id="{03CC8810-73B9-4AE1-A855-A3BC733385BC}"/>
+              </a:ext>
+            </a:extLst>
+          </p:cNvPr>
+          <p:cNvSpPr/>
+          <p:nvPr/>
+        </p:nvSpPr>
+        <p:spPr>
+          <a:xfrm>
+            <a:off x="4989320" y="1242159"/>
+            <a:ext cx="1317476" cy="684213"/>
+          </a:xfrm>
+          <a:prstGeom prst="roundRect">
+            <a:avLst/>
+          </a:prstGeom>
+          <a:noFill/>
+          <a:ln w="38100" cap="flat" cmpd="sng" algn="ctr">
+            <a:solidFill>
+              <a:schemeClr val="accent5"/>
+            </a:solidFill>
+            <a:prstDash val="solid"/>
+            <a:round/>
+            <a:headEnd type="none" w="med" len="med"/>
+            <a:tailEnd type="none" w="med" len="med"/>
+          </a:ln>
+        </p:spPr>
+        <p:style>
+          <a:lnRef idx="0">
+            <a:scrgbClr r="0" g="0" b="0"/>
+          </a:lnRef>
+          <a:fillRef idx="0">
+            <a:scrgbClr r="0" g="0" b="0"/>
+          </a:fillRef>
+          <a:effectRef idx="0">
+            <a:scrgbClr r="0" g="0" b="0"/>
+          </a:effectRef>
+          <a:fontRef idx="minor">
+            <a:schemeClr val="accent5"/>
+          </a:fontRef>
+        </p:style>
+        <p:txBody>
+          <a:bodyPr rtlCol="0" anchor="ctr"/>
+          <a:lstStyle/>
+          <a:p>
+            <a:pPr algn="ctr"/>
+            <a:endParaRPr lang="de-DE"/>
+          </a:p>
+        </p:txBody>
+      </p:sp>
+      <p:sp>
+        <p:nvSpPr>
+          <p:cNvPr id="8" name="Rechteck: abgerundete Ecken 7">
+            <a:extLst>
+              <a:ext uri="{FF2B5EF4-FFF2-40B4-BE49-F238E27FC236}">
+                <a16:creationId xmlns:a16="http://schemas.microsoft.com/office/drawing/2014/main" id="{63845157-AEE3-4F2E-85A4-7CDCD031DC2C}"/>
+              </a:ext>
+            </a:extLst>
+          </p:cNvPr>
+          <p:cNvSpPr/>
+          <p:nvPr/>
+        </p:nvSpPr>
+        <p:spPr>
+          <a:xfrm>
+            <a:off x="1340266" y="2632105"/>
+            <a:ext cx="2479704" cy="822533"/>
+          </a:xfrm>
+          <a:prstGeom prst="roundRect">
+            <a:avLst/>
+          </a:prstGeom>
+          <a:noFill/>
+          <a:ln w="38100" cap="flat" cmpd="sng" algn="ctr">
+            <a:solidFill>
+              <a:schemeClr val="accent5"/>
+            </a:solidFill>
+            <a:prstDash val="solid"/>
+            <a:round/>
+            <a:headEnd type="none" w="med" len="med"/>
+            <a:tailEnd type="none" w="med" len="med"/>
+          </a:ln>
+        </p:spPr>
+        <p:style>
+          <a:lnRef idx="0">
+            <a:scrgbClr r="0" g="0" b="0"/>
+          </a:lnRef>
+          <a:fillRef idx="0">
+            <a:scrgbClr r="0" g="0" b="0"/>
+          </a:fillRef>
+          <a:effectRef idx="0">
+            <a:scrgbClr r="0" g="0" b="0"/>
+          </a:effectRef>
+          <a:fontRef idx="minor">
+            <a:schemeClr val="accent5"/>
+          </a:fontRef>
+        </p:style>
+        <p:txBody>
+          <a:bodyPr rtlCol="0" anchor="ctr"/>
+          <a:lstStyle/>
+          <a:p>
+            <a:pPr algn="ctr"/>
+            <a:endParaRPr lang="de-DE"/>
+          </a:p>
+        </p:txBody>
+      </p:sp>
+      <p:sp>
+        <p:nvSpPr>
+          <p:cNvPr id="9" name="Rechteck: abgerundete Ecken 8">
+            <a:extLst>
+              <a:ext uri="{FF2B5EF4-FFF2-40B4-BE49-F238E27FC236}">
+                <a16:creationId xmlns:a16="http://schemas.microsoft.com/office/drawing/2014/main" id="{87EDA181-80F4-439B-BD32-53F513972374}"/>
+              </a:ext>
+            </a:extLst>
+          </p:cNvPr>
+          <p:cNvSpPr/>
+          <p:nvPr/>
+        </p:nvSpPr>
+        <p:spPr>
+          <a:xfrm>
+            <a:off x="8238146" y="3878367"/>
+            <a:ext cx="1034041" cy="676542"/>
+          </a:xfrm>
+          <a:prstGeom prst="roundRect">
+            <a:avLst/>
+          </a:prstGeom>
+          <a:noFill/>
+          <a:ln w="38100" cap="flat" cmpd="sng" algn="ctr">
+            <a:solidFill>
+              <a:schemeClr val="accent5"/>
+            </a:solidFill>
+            <a:prstDash val="solid"/>
+            <a:round/>
+            <a:headEnd type="none" w="med" len="med"/>
+            <a:tailEnd type="none" w="med" len="med"/>
+          </a:ln>
+        </p:spPr>
+        <p:style>
+          <a:lnRef idx="0">
+            <a:scrgbClr r="0" g="0" b="0"/>
+          </a:lnRef>
+          <a:fillRef idx="0">
+            <a:scrgbClr r="0" g="0" b="0"/>
+          </a:fillRef>
+          <a:effectRef idx="0">
+            <a:scrgbClr r="0" g="0" b="0"/>
+          </a:effectRef>
+          <a:fontRef idx="minor">
+            <a:schemeClr val="accent5"/>
+          </a:fontRef>
+        </p:style>
+        <p:txBody>
+          <a:bodyPr rtlCol="0" anchor="ctr"/>
+          <a:lstStyle/>
+          <a:p>
+            <a:pPr algn="ctr"/>
+            <a:endParaRPr lang="de-DE"/>
           </a:p>
         </p:txBody>
       </p:sp>
     </p:spTree>
     <p:extLst>
       <p:ext uri="{BB962C8B-B14F-4D97-AF65-F5344CB8AC3E}">
-        <p14:creationId xmlns:p14="http://schemas.microsoft.com/office/powerpoint/2010/main" val="924803363"/>
+        <p14:creationId xmlns:p14="http://schemas.microsoft.com/office/powerpoint/2010/main" val="3295387376"/>
       </p:ext>
     </p:extLst>
   </p:cSld>
@@ -9105,7 +8630,7 @@
 </p:sld>
 </file>
 
-<file path=ppt/slides/slide7.xml><?xml version="1.0" encoding="utf-8"?>
+<file path=ppt/slides/slide12.xml><?xml version="1.0" encoding="utf-8"?>
 <p:sld xmlns:a="http://schemas.openxmlformats.org/drawingml/2006/main" xmlns:r="http://schemas.openxmlformats.org/officeDocument/2006/relationships" xmlns:p="http://schemas.openxmlformats.org/presentationml/2006/main">
   <p:cSld>
     <p:spTree>
@@ -9234,7 +8759,7 @@
 </p:sld>
 </file>
 
-<file path=ppt/slides/slide8.xml><?xml version="1.0" encoding="utf-8"?>
+<file path=ppt/slides/slide13.xml><?xml version="1.0" encoding="utf-8"?>
 <p:sld xmlns:a="http://schemas.openxmlformats.org/drawingml/2006/main" xmlns:r="http://schemas.openxmlformats.org/officeDocument/2006/relationships" xmlns:p="http://schemas.openxmlformats.org/presentationml/2006/main">
   <p:cSld>
     <p:spTree>
@@ -9361,6 +8886,146 @@
           </a:p>
         </p:txBody>
       </p:sp>
+    </p:spTree>
+    <p:extLst>
+      <p:ext uri="{BB962C8B-B14F-4D97-AF65-F5344CB8AC3E}">
+        <p14:creationId xmlns:p14="http://schemas.microsoft.com/office/powerpoint/2010/main" val="2766432069"/>
+      </p:ext>
+    </p:extLst>
+  </p:cSld>
+  <p:clrMapOvr>
+    <a:masterClrMapping/>
+  </p:clrMapOvr>
+</p:sld>
+</file>
+
+<file path=ppt/slides/slide14.xml><?xml version="1.0" encoding="utf-8"?>
+<p:sld xmlns:a="http://schemas.openxmlformats.org/drawingml/2006/main" xmlns:r="http://schemas.openxmlformats.org/officeDocument/2006/relationships" xmlns:p="http://schemas.openxmlformats.org/presentationml/2006/main">
+  <p:cSld>
+    <p:spTree>
+      <p:nvGrpSpPr>
+        <p:cNvPr id="1" name=""/>
+        <p:cNvGrpSpPr/>
+        <p:nvPr/>
+      </p:nvGrpSpPr>
+      <p:grpSpPr>
+        <a:xfrm>
+          <a:off x="0" y="0"/>
+          <a:ext cx="0" cy="0"/>
+          <a:chOff x="0" y="0"/>
+          <a:chExt cx="0" cy="0"/>
+        </a:xfrm>
+      </p:grpSpPr>
+      <p:sp>
+        <p:nvSpPr>
+          <p:cNvPr id="2" name="Titel 1">
+            <a:extLst>
+              <a:ext uri="{FF2B5EF4-FFF2-40B4-BE49-F238E27FC236}">
+                <a16:creationId xmlns:a16="http://schemas.microsoft.com/office/drawing/2014/main" id="{9A412E5E-34B8-4161-B351-6932A0625BA2}"/>
+              </a:ext>
+            </a:extLst>
+          </p:cNvPr>
+          <p:cNvSpPr>
+            <a:spLocks noGrp="1"/>
+          </p:cNvSpPr>
+          <p:nvPr>
+            <p:ph type="title"/>
+          </p:nvPr>
+        </p:nvSpPr>
+        <p:spPr/>
+        <p:txBody>
+          <a:bodyPr/>
+          <a:lstStyle/>
+          <a:p>
+            <a:r>
+              <a:rPr lang="de-DE" dirty="0"/>
+              <a:t>Probleme und Lösungsansätze</a:t>
+            </a:r>
+            <a:br>
+              <a:rPr lang="de-DE" dirty="0"/>
+            </a:br>
+            <a:r>
+              <a:rPr lang="de-DE" b="0" dirty="0"/>
+              <a:t>Problem 4</a:t>
+            </a:r>
+          </a:p>
+        </p:txBody>
+      </p:sp>
+      <p:sp>
+        <p:nvSpPr>
+          <p:cNvPr id="3" name="Inhaltsplatzhalter 2">
+            <a:extLst>
+              <a:ext uri="{FF2B5EF4-FFF2-40B4-BE49-F238E27FC236}">
+                <a16:creationId xmlns:a16="http://schemas.microsoft.com/office/drawing/2014/main" id="{FCF4E8FF-213C-49C5-B5E4-86B00FF71ED0}"/>
+              </a:ext>
+            </a:extLst>
+          </p:cNvPr>
+          <p:cNvSpPr>
+            <a:spLocks noGrp="1"/>
+          </p:cNvSpPr>
+          <p:nvPr>
+            <p:ph sz="quarter" idx="10"/>
+          </p:nvPr>
+        </p:nvSpPr>
+        <p:spPr>
+          <a:xfrm>
+            <a:off x="874711" y="1484313"/>
+            <a:ext cx="10580688" cy="4344987"/>
+          </a:xfrm>
+        </p:spPr>
+        <p:txBody>
+          <a:bodyPr/>
+          <a:lstStyle/>
+          <a:p>
+            <a:r>
+              <a:rPr lang="de-DE" u="sng" dirty="0"/>
+              <a:t>Problem:</a:t>
+            </a:r>
+          </a:p>
+          <a:p>
+            <a:pPr marL="285750" indent="-285750">
+              <a:buFont typeface="Arial" panose="020B0604020202020204" pitchFamily="34" charset="0"/>
+              <a:buChar char="•"/>
+            </a:pPr>
+            <a:r>
+              <a:rPr lang="de-DE" dirty="0" err="1"/>
+              <a:t>Salespoint</a:t>
+            </a:r>
+            <a:r>
+              <a:rPr lang="de-DE" dirty="0"/>
+              <a:t> Datenbank (relationale DB) kann keine dynamischen Typen speichern</a:t>
+            </a:r>
+          </a:p>
+          <a:p>
+            <a:pPr marL="285750" indent="-285750">
+              <a:buFont typeface="Arial" panose="020B0604020202020204" pitchFamily="34" charset="0"/>
+              <a:buChar char="•"/>
+            </a:pPr>
+            <a:endParaRPr lang="de-DE" dirty="0"/>
+          </a:p>
+          <a:p>
+            <a:r>
+              <a:rPr lang="de-DE" u="sng" dirty="0"/>
+              <a:t>Lösungsansatz:</a:t>
+            </a:r>
+          </a:p>
+          <a:p>
+            <a:pPr marL="285750" indent="-285750">
+              <a:buFont typeface="Arial" panose="020B0604020202020204" pitchFamily="34" charset="0"/>
+              <a:buChar char="•"/>
+            </a:pPr>
+            <a:r>
+              <a:rPr lang="de-DE" dirty="0"/>
+              <a:t>Mongo Datenbank</a:t>
+            </a:r>
+          </a:p>
+          <a:p>
+            <a:endParaRPr lang="de-DE" dirty="0">
+              <a:sym typeface="Wingdings" panose="05000000000000000000" pitchFamily="2" charset="2"/>
+            </a:endParaRPr>
+          </a:p>
+        </p:txBody>
+      </p:sp>
       <p:sp>
         <p:nvSpPr>
           <p:cNvPr id="4" name="Textfeld 3">
@@ -9523,7 +9188,7 @@
     </p:spTree>
     <p:extLst>
       <p:ext uri="{BB962C8B-B14F-4D97-AF65-F5344CB8AC3E}">
-        <p14:creationId xmlns:p14="http://schemas.microsoft.com/office/powerpoint/2010/main" val="2766432069"/>
+        <p14:creationId xmlns:p14="http://schemas.microsoft.com/office/powerpoint/2010/main" val="3255767546"/>
       </p:ext>
     </p:extLst>
   </p:cSld>
@@ -9673,7 +9338,7 @@
 </p:sld>
 </file>
 
-<file path=ppt/slides/slide9.xml><?xml version="1.0" encoding="utf-8"?>
+<file path=ppt/slides/slide15.xml><?xml version="1.0" encoding="utf-8"?>
 <p:sld xmlns:a="http://schemas.openxmlformats.org/drawingml/2006/main" xmlns:r="http://schemas.openxmlformats.org/officeDocument/2006/relationships" xmlns:p="http://schemas.openxmlformats.org/presentationml/2006/main">
   <p:cSld>
     <p:spTree>
@@ -9742,6 +9407,1523 @@
     <p:extLst>
       <p:ext uri="{BB962C8B-B14F-4D97-AF65-F5344CB8AC3E}">
         <p14:creationId xmlns:p14="http://schemas.microsoft.com/office/powerpoint/2010/main" val="346586161"/>
+      </p:ext>
+    </p:extLst>
+  </p:cSld>
+  <p:clrMapOvr>
+    <a:masterClrMapping/>
+  </p:clrMapOvr>
+</p:sld>
+</file>
+
+<file path=ppt/slides/slide16.xml><?xml version="1.0" encoding="utf-8"?>
+<p:sld xmlns:a="http://schemas.openxmlformats.org/drawingml/2006/main" xmlns:r="http://schemas.openxmlformats.org/officeDocument/2006/relationships" xmlns:p="http://schemas.openxmlformats.org/presentationml/2006/main">
+  <p:cSld>
+    <p:spTree>
+      <p:nvGrpSpPr>
+        <p:cNvPr id="1" name=""/>
+        <p:cNvGrpSpPr/>
+        <p:nvPr/>
+      </p:nvGrpSpPr>
+      <p:grpSpPr>
+        <a:xfrm>
+          <a:off x="0" y="0"/>
+          <a:ext cx="0" cy="0"/>
+          <a:chOff x="0" y="0"/>
+          <a:chExt cx="0" cy="0"/>
+        </a:xfrm>
+      </p:grpSpPr>
+      <p:sp>
+        <p:nvSpPr>
+          <p:cNvPr id="2" name="Titel 1"/>
+          <p:cNvSpPr>
+            <a:spLocks noGrp="1"/>
+          </p:cNvSpPr>
+          <p:nvPr>
+            <p:ph type="title"/>
+          </p:nvPr>
+        </p:nvSpPr>
+        <p:spPr/>
+        <p:txBody>
+          <a:bodyPr/>
+          <a:lstStyle/>
+          <a:p>
+            <a:pPr lvl="5"/>
+            <a:r>
+              <a:rPr lang="de-DE" sz="3600" b="1" dirty="0">
+                <a:solidFill>
+                  <a:schemeClr val="bg1"/>
+                </a:solidFill>
+                <a:latin typeface="+mj-lt"/>
+              </a:rPr>
+              <a:t>Diskussion</a:t>
+            </a:r>
+            <a:br>
+              <a:rPr lang="de-DE" sz="3600" b="1" dirty="0">
+                <a:solidFill>
+                  <a:schemeClr val="bg1"/>
+                </a:solidFill>
+                <a:latin typeface="+mj-lt"/>
+              </a:rPr>
+            </a:br>
+            <a:r>
+              <a:rPr lang="de-DE" sz="3600" dirty="0">
+                <a:solidFill>
+                  <a:schemeClr val="bg1"/>
+                </a:solidFill>
+                <a:latin typeface="+mj-lt"/>
+              </a:rPr>
+              <a:t>Fragen/ Anmerkungen ?</a:t>
+            </a:r>
+          </a:p>
+        </p:txBody>
+      </p:sp>
+    </p:spTree>
+    <p:custDataLst>
+      <p:tags r:id="rId1"/>
+    </p:custDataLst>
+    <p:extLst>
+      <p:ext uri="{BB962C8B-B14F-4D97-AF65-F5344CB8AC3E}">
+        <p14:creationId xmlns:p14="http://schemas.microsoft.com/office/powerpoint/2010/main" val="1909366443"/>
+      </p:ext>
+    </p:extLst>
+  </p:cSld>
+  <p:clrMapOvr>
+    <a:masterClrMapping/>
+  </p:clrMapOvr>
+</p:sld>
+</file>
+
+<file path=ppt/slides/slide17.xml><?xml version="1.0" encoding="utf-8"?>
+<p:sld xmlns:a="http://schemas.openxmlformats.org/drawingml/2006/main" xmlns:r="http://schemas.openxmlformats.org/officeDocument/2006/relationships" xmlns:p="http://schemas.openxmlformats.org/presentationml/2006/main">
+  <p:cSld>
+    <p:spTree>
+      <p:nvGrpSpPr>
+        <p:cNvPr id="1" name=""/>
+        <p:cNvGrpSpPr/>
+        <p:nvPr/>
+      </p:nvGrpSpPr>
+      <p:grpSpPr>
+        <a:xfrm>
+          <a:off x="0" y="0"/>
+          <a:ext cx="0" cy="0"/>
+          <a:chOff x="0" y="0"/>
+          <a:chExt cx="0" cy="0"/>
+        </a:xfrm>
+      </p:grpSpPr>
+      <p:sp>
+        <p:nvSpPr>
+          <p:cNvPr id="2" name="Titel 1">
+            <a:extLst>
+              <a:ext uri="{FF2B5EF4-FFF2-40B4-BE49-F238E27FC236}">
+                <a16:creationId xmlns:a16="http://schemas.microsoft.com/office/drawing/2014/main" id="{610E12A8-9CCA-440E-92DF-89DE560850D4}"/>
+              </a:ext>
+            </a:extLst>
+          </p:cNvPr>
+          <p:cNvSpPr>
+            <a:spLocks noGrp="1"/>
+          </p:cNvSpPr>
+          <p:nvPr>
+            <p:ph type="title"/>
+          </p:nvPr>
+        </p:nvSpPr>
+        <p:spPr>
+          <a:xfrm>
+            <a:off x="805656" y="3136544"/>
+            <a:ext cx="10580687" cy="584912"/>
+          </a:xfrm>
+        </p:spPr>
+        <p:txBody>
+          <a:bodyPr/>
+          <a:lstStyle/>
+          <a:p>
+            <a:pPr algn="ctr"/>
+            <a:r>
+              <a:rPr lang="de-DE" dirty="0"/>
+              <a:t>Vielen Dank fürs Zuhören</a:t>
+            </a:r>
+          </a:p>
+        </p:txBody>
+      </p:sp>
+    </p:spTree>
+    <p:extLst>
+      <p:ext uri="{BB962C8B-B14F-4D97-AF65-F5344CB8AC3E}">
+        <p14:creationId xmlns:p14="http://schemas.microsoft.com/office/powerpoint/2010/main" val="779204632"/>
+      </p:ext>
+    </p:extLst>
+  </p:cSld>
+  <p:clrMapOvr>
+    <a:masterClrMapping/>
+  </p:clrMapOvr>
+</p:sld>
+</file>
+
+<file path=ppt/slides/slide2.xml><?xml version="1.0" encoding="utf-8"?>
+<p:sld xmlns:a="http://schemas.openxmlformats.org/drawingml/2006/main" xmlns:r="http://schemas.openxmlformats.org/officeDocument/2006/relationships" xmlns:p="http://schemas.openxmlformats.org/presentationml/2006/main">
+  <p:cSld>
+    <p:spTree>
+      <p:nvGrpSpPr>
+        <p:cNvPr id="1" name=""/>
+        <p:cNvGrpSpPr/>
+        <p:nvPr/>
+      </p:nvGrpSpPr>
+      <p:grpSpPr>
+        <a:xfrm>
+          <a:off x="0" y="0"/>
+          <a:ext cx="0" cy="0"/>
+          <a:chOff x="0" y="0"/>
+          <a:chExt cx="0" cy="0"/>
+        </a:xfrm>
+      </p:grpSpPr>
+      <p:sp>
+        <p:nvSpPr>
+          <p:cNvPr id="3" name="Titel 2"/>
+          <p:cNvSpPr>
+            <a:spLocks noGrp="1"/>
+          </p:cNvSpPr>
+          <p:nvPr>
+            <p:ph type="title"/>
+          </p:nvPr>
+        </p:nvSpPr>
+        <p:spPr/>
+        <p:txBody>
+          <a:bodyPr/>
+          <a:lstStyle/>
+          <a:p>
+            <a:r>
+              <a:rPr lang="de-DE" dirty="0"/>
+              <a:t>Inhalte</a:t>
+            </a:r>
+            <a:br>
+              <a:rPr lang="de-DE" dirty="0"/>
+            </a:br>
+            <a:r>
+              <a:rPr lang="de-DE" b="0" dirty="0"/>
+              <a:t>des Zwischenpräsentation</a:t>
+            </a:r>
+          </a:p>
+        </p:txBody>
+      </p:sp>
+      <p:sp>
+        <p:nvSpPr>
+          <p:cNvPr id="2" name="Inhaltsplatzhalter 1"/>
+          <p:cNvSpPr>
+            <a:spLocks noGrp="1"/>
+          </p:cNvSpPr>
+          <p:nvPr>
+            <p:ph sz="quarter" idx="10"/>
+          </p:nvPr>
+        </p:nvSpPr>
+        <p:spPr/>
+        <p:txBody>
+          <a:bodyPr/>
+          <a:lstStyle/>
+          <a:p>
+            <a:r>
+              <a:rPr lang="de-DE" b="1" dirty="0"/>
+              <a:t>Entwurfsentscheidungen </a:t>
+            </a:r>
+            <a:r>
+              <a:rPr lang="de-DE" dirty="0"/>
+              <a:t>im Projekt</a:t>
+            </a:r>
+          </a:p>
+          <a:p>
+            <a:pPr lvl="1"/>
+            <a:r>
+              <a:rPr lang="de-DE" dirty="0"/>
+              <a:t>Departments</a:t>
+            </a:r>
+          </a:p>
+          <a:p>
+            <a:pPr lvl="1"/>
+            <a:r>
+              <a:rPr lang="de-DE" dirty="0"/>
+              <a:t>Probleme &amp; Lösungsansätze</a:t>
+            </a:r>
+          </a:p>
+          <a:p>
+            <a:pPr marL="71989" lvl="1" indent="0">
+              <a:buNone/>
+            </a:pPr>
+            <a:endParaRPr lang="de-DE" dirty="0"/>
+          </a:p>
+          <a:p>
+            <a:r>
+              <a:rPr lang="de-DE" b="1" dirty="0"/>
+              <a:t>Vorführung </a:t>
+            </a:r>
+            <a:r>
+              <a:rPr lang="de-DE" dirty="0"/>
+              <a:t>der Software</a:t>
+            </a:r>
+          </a:p>
+          <a:p>
+            <a:pPr lvl="1"/>
+            <a:r>
+              <a:rPr lang="de-DE" dirty="0"/>
+              <a:t>Altes Layout</a:t>
+            </a:r>
+          </a:p>
+          <a:p>
+            <a:pPr lvl="1"/>
+            <a:r>
+              <a:rPr lang="de-DE" dirty="0"/>
+              <a:t>Neues Layout</a:t>
+            </a:r>
+          </a:p>
+          <a:p>
+            <a:pPr lvl="1"/>
+            <a:r>
+              <a:rPr lang="de-DE" dirty="0"/>
+              <a:t>2-3 Use Cases</a:t>
+            </a:r>
+          </a:p>
+          <a:p>
+            <a:pPr lvl="1"/>
+            <a:endParaRPr lang="de-DE" dirty="0"/>
+          </a:p>
+          <a:p>
+            <a:r>
+              <a:rPr lang="de-DE" b="1" dirty="0"/>
+              <a:t>Diskussion</a:t>
+            </a:r>
+          </a:p>
+        </p:txBody>
+      </p:sp>
+    </p:spTree>
+    <p:custDataLst>
+      <p:tags r:id="rId1"/>
+    </p:custDataLst>
+    <p:extLst>
+      <p:ext uri="{BB962C8B-B14F-4D97-AF65-F5344CB8AC3E}">
+        <p14:creationId xmlns:p14="http://schemas.microsoft.com/office/powerpoint/2010/main" val="296809162"/>
+      </p:ext>
+    </p:extLst>
+  </p:cSld>
+  <p:clrMapOvr>
+    <a:masterClrMapping/>
+  </p:clrMapOvr>
+</p:sld>
+</file>
+
+<file path=ppt/slides/slide3.xml><?xml version="1.0" encoding="utf-8"?>
+<p:sld xmlns:a="http://schemas.openxmlformats.org/drawingml/2006/main" xmlns:r="http://schemas.openxmlformats.org/officeDocument/2006/relationships" xmlns:p="http://schemas.openxmlformats.org/presentationml/2006/main">
+  <p:cSld>
+    <p:spTree>
+      <p:nvGrpSpPr>
+        <p:cNvPr id="1" name=""/>
+        <p:cNvGrpSpPr/>
+        <p:nvPr/>
+      </p:nvGrpSpPr>
+      <p:grpSpPr>
+        <a:xfrm>
+          <a:off x="0" y="0"/>
+          <a:ext cx="0" cy="0"/>
+          <a:chOff x="0" y="0"/>
+          <a:chExt cx="0" cy="0"/>
+        </a:xfrm>
+      </p:grpSpPr>
+      <p:sp>
+        <p:nvSpPr>
+          <p:cNvPr id="2" name="Titel 1"/>
+          <p:cNvSpPr>
+            <a:spLocks noGrp="1"/>
+          </p:cNvSpPr>
+          <p:nvPr>
+            <p:ph type="title"/>
+          </p:nvPr>
+        </p:nvSpPr>
+        <p:spPr/>
+        <p:txBody>
+          <a:bodyPr/>
+          <a:lstStyle/>
+          <a:p>
+            <a:pPr lvl="5"/>
+            <a:r>
+              <a:rPr lang="de-DE" sz="3600" b="1" dirty="0">
+                <a:solidFill>
+                  <a:schemeClr val="bg1"/>
+                </a:solidFill>
+                <a:latin typeface="+mj-lt"/>
+              </a:rPr>
+              <a:t>Entwurfsentscheidungen</a:t>
+            </a:r>
+            <a:br>
+              <a:rPr lang="de-DE" sz="3600" b="1" dirty="0">
+                <a:solidFill>
+                  <a:schemeClr val="bg1"/>
+                </a:solidFill>
+                <a:latin typeface="+mj-lt"/>
+              </a:rPr>
+            </a:br>
+            <a:r>
+              <a:rPr lang="de-DE" sz="3600" dirty="0">
+                <a:solidFill>
+                  <a:schemeClr val="bg1"/>
+                </a:solidFill>
+                <a:latin typeface="+mj-lt"/>
+              </a:rPr>
+              <a:t>im Projekt</a:t>
+            </a:r>
+          </a:p>
+        </p:txBody>
+      </p:sp>
+    </p:spTree>
+    <p:custDataLst>
+      <p:tags r:id="rId1"/>
+    </p:custDataLst>
+    <p:extLst>
+      <p:ext uri="{BB962C8B-B14F-4D97-AF65-F5344CB8AC3E}">
+        <p14:creationId xmlns:p14="http://schemas.microsoft.com/office/powerpoint/2010/main" val="1561740236"/>
+      </p:ext>
+    </p:extLst>
+  </p:cSld>
+  <p:clrMapOvr>
+    <a:masterClrMapping/>
+  </p:clrMapOvr>
+</p:sld>
+</file>
+
+<file path=ppt/slides/slide4.xml><?xml version="1.0" encoding="utf-8"?>
+<p:sld xmlns:a="http://schemas.openxmlformats.org/drawingml/2006/main" xmlns:r="http://schemas.openxmlformats.org/officeDocument/2006/relationships" xmlns:p="http://schemas.openxmlformats.org/presentationml/2006/main">
+  <p:cSld>
+    <p:spTree>
+      <p:nvGrpSpPr>
+        <p:cNvPr id="1" name=""/>
+        <p:cNvGrpSpPr/>
+        <p:nvPr/>
+      </p:nvGrpSpPr>
+      <p:grpSpPr>
+        <a:xfrm>
+          <a:off x="0" y="0"/>
+          <a:ext cx="0" cy="0"/>
+          <a:chOff x="0" y="0"/>
+          <a:chExt cx="0" cy="0"/>
+        </a:xfrm>
+      </p:grpSpPr>
+      <p:sp>
+        <p:nvSpPr>
+          <p:cNvPr id="3" name="Titel 2"/>
+          <p:cNvSpPr>
+            <a:spLocks noGrp="1"/>
+          </p:cNvSpPr>
+          <p:nvPr>
+            <p:ph type="title"/>
+          </p:nvPr>
+        </p:nvSpPr>
+        <p:spPr/>
+        <p:txBody>
+          <a:bodyPr/>
+          <a:lstStyle/>
+          <a:p>
+            <a:r>
+              <a:rPr lang="de-DE" dirty="0"/>
+              <a:t>Departments</a:t>
+            </a:r>
+            <a:endParaRPr lang="de-DE" b="0" dirty="0"/>
+          </a:p>
+        </p:txBody>
+      </p:sp>
+      <p:graphicFrame>
+        <p:nvGraphicFramePr>
+          <p:cNvPr id="11" name="Inhaltsplatzhalter 10">
+            <a:extLst>
+              <a:ext uri="{FF2B5EF4-FFF2-40B4-BE49-F238E27FC236}">
+                <a16:creationId xmlns:a16="http://schemas.microsoft.com/office/drawing/2014/main" id="{FEF4759C-AF07-4DD1-B53B-12FE904688CB}"/>
+              </a:ext>
+            </a:extLst>
+          </p:cNvPr>
+          <p:cNvGraphicFramePr>
+            <a:graphicFrameLocks noGrp="1"/>
+          </p:cNvGraphicFramePr>
+          <p:nvPr>
+            <p:ph sz="quarter" idx="10"/>
+            <p:extLst>
+              <p:ext uri="{D42A27DB-BD31-4B8C-83A1-F6EECF244321}">
+                <p14:modId xmlns:p14="http://schemas.microsoft.com/office/powerpoint/2010/main" val="2573639310"/>
+              </p:ext>
+            </p:extLst>
+          </p:nvPr>
+        </p:nvGraphicFramePr>
+        <p:xfrm>
+          <a:off x="874713" y="322324"/>
+          <a:ext cx="10580687" cy="5801507"/>
+        </p:xfrm>
+        <a:graphic>
+          <a:graphicData uri="http://schemas.openxmlformats.org/drawingml/2006/diagram">
+            <dgm:relIds xmlns:dgm="http://schemas.openxmlformats.org/drawingml/2006/diagram" xmlns:r="http://schemas.openxmlformats.org/officeDocument/2006/relationships" r:dm="rId3" r:lo="rId4" r:qs="rId5" r:cs="rId6"/>
+          </a:graphicData>
+        </a:graphic>
+      </p:graphicFrame>
+      <p:pic>
+        <p:nvPicPr>
+          <p:cNvPr id="13" name="Grafik 12">
+            <a:extLst>
+              <a:ext uri="{FF2B5EF4-FFF2-40B4-BE49-F238E27FC236}">
+                <a16:creationId xmlns:a16="http://schemas.microsoft.com/office/drawing/2014/main" id="{3AEA5AE6-C91F-4963-879E-482CFFD25E0F}"/>
+              </a:ext>
+            </a:extLst>
+          </p:cNvPr>
+          <p:cNvPicPr>
+            <a:picLocks noChangeAspect="1"/>
+          </p:cNvPicPr>
+          <p:nvPr/>
+        </p:nvPicPr>
+        <p:blipFill>
+          <a:blip r:embed="rId8" cstate="print">
+            <a:extLst>
+              <a:ext uri="{28A0092B-C50C-407E-A947-70E740481C1C}">
+                <a14:useLocalDpi xmlns:a14="http://schemas.microsoft.com/office/drawing/2010/main" val="0"/>
+              </a:ext>
+            </a:extLst>
+          </a:blip>
+          <a:stretch>
+            <a:fillRect/>
+          </a:stretch>
+        </p:blipFill>
+        <p:spPr>
+          <a:xfrm>
+            <a:off x="4954555" y="2207974"/>
+            <a:ext cx="2446989" cy="2224841"/>
+          </a:xfrm>
+          <a:prstGeom prst="rect">
+            <a:avLst/>
+          </a:prstGeom>
+        </p:spPr>
+      </p:pic>
+    </p:spTree>
+    <p:custDataLst>
+      <p:tags r:id="rId1"/>
+    </p:custDataLst>
+    <p:extLst>
+      <p:ext uri="{BB962C8B-B14F-4D97-AF65-F5344CB8AC3E}">
+        <p14:creationId xmlns:p14="http://schemas.microsoft.com/office/powerpoint/2010/main" val="195351814"/>
+      </p:ext>
+    </p:extLst>
+  </p:cSld>
+  <p:clrMapOvr>
+    <a:masterClrMapping/>
+  </p:clrMapOvr>
+</p:sld>
+</file>
+
+<file path=ppt/slides/slide5.xml><?xml version="1.0" encoding="utf-8"?>
+<p:sld xmlns:a="http://schemas.openxmlformats.org/drawingml/2006/main" xmlns:r="http://schemas.openxmlformats.org/officeDocument/2006/relationships" xmlns:p="http://schemas.openxmlformats.org/presentationml/2006/main">
+  <p:cSld>
+    <p:spTree>
+      <p:nvGrpSpPr>
+        <p:cNvPr id="1" name=""/>
+        <p:cNvGrpSpPr/>
+        <p:nvPr/>
+      </p:nvGrpSpPr>
+      <p:grpSpPr>
+        <a:xfrm>
+          <a:off x="0" y="0"/>
+          <a:ext cx="0" cy="0"/>
+          <a:chOff x="0" y="0"/>
+          <a:chExt cx="0" cy="0"/>
+        </a:xfrm>
+      </p:grpSpPr>
+      <p:sp>
+        <p:nvSpPr>
+          <p:cNvPr id="2" name="Titel 1">
+            <a:extLst>
+              <a:ext uri="{FF2B5EF4-FFF2-40B4-BE49-F238E27FC236}">
+                <a16:creationId xmlns:a16="http://schemas.microsoft.com/office/drawing/2014/main" id="{47A7BB8D-DB90-4C12-A26A-3E193428521D}"/>
+              </a:ext>
+            </a:extLst>
+          </p:cNvPr>
+          <p:cNvSpPr>
+            <a:spLocks noGrp="1"/>
+          </p:cNvSpPr>
+          <p:nvPr>
+            <p:ph type="title"/>
+          </p:nvPr>
+        </p:nvSpPr>
+        <p:spPr/>
+        <p:txBody>
+          <a:bodyPr/>
+          <a:lstStyle/>
+          <a:p>
+            <a:r>
+              <a:rPr lang="de-DE" dirty="0"/>
+              <a:t>Probleme und Lösungsansätze</a:t>
+            </a:r>
+            <a:br>
+              <a:rPr lang="de-DE" dirty="0"/>
+            </a:br>
+            <a:r>
+              <a:rPr lang="de-DE" b="0" dirty="0"/>
+              <a:t>Problem 1</a:t>
+            </a:r>
+          </a:p>
+        </p:txBody>
+      </p:sp>
+      <p:sp>
+        <p:nvSpPr>
+          <p:cNvPr id="6" name="Inhaltsplatzhalter 5">
+            <a:extLst>
+              <a:ext uri="{FF2B5EF4-FFF2-40B4-BE49-F238E27FC236}">
+                <a16:creationId xmlns:a16="http://schemas.microsoft.com/office/drawing/2014/main" id="{2CBD6F4E-19E8-4ECD-A2F2-16B77AB2F32F}"/>
+              </a:ext>
+            </a:extLst>
+          </p:cNvPr>
+          <p:cNvSpPr>
+            <a:spLocks noGrp="1"/>
+          </p:cNvSpPr>
+          <p:nvPr>
+            <p:ph sz="quarter" idx="10"/>
+          </p:nvPr>
+        </p:nvSpPr>
+        <p:spPr/>
+        <p:txBody>
+          <a:bodyPr/>
+          <a:lstStyle/>
+          <a:p>
+            <a:r>
+              <a:rPr lang="de-DE" u="sng" dirty="0"/>
+              <a:t>Aufgabenstellung:</a:t>
+            </a:r>
+          </a:p>
+          <a:p>
+            <a:pPr marL="285750" indent="-285750">
+              <a:buFont typeface="Arial" panose="020B0604020202020204" pitchFamily="34" charset="0"/>
+              <a:buChar char="•"/>
+            </a:pPr>
+            <a:r>
+              <a:rPr lang="de-DE" dirty="0"/>
+              <a:t>Großhändlerproduktdatenbank kann bis zu 10.000 Artikel enthalten</a:t>
+            </a:r>
+          </a:p>
+          <a:p>
+            <a:pPr marL="285750" indent="-285750">
+              <a:buFont typeface="Arial" panose="020B0604020202020204" pitchFamily="34" charset="0"/>
+              <a:buChar char="•"/>
+            </a:pPr>
+            <a:r>
+              <a:rPr lang="de-DE" dirty="0"/>
+              <a:t>Angebotene Produktdatenbank kann maximal 999 Artikel beinhalten</a:t>
+            </a:r>
+          </a:p>
+          <a:p>
+            <a:pPr marL="285750" indent="-285750">
+              <a:buFont typeface="Arial" panose="020B0604020202020204" pitchFamily="34" charset="0"/>
+              <a:buChar char="•"/>
+            </a:pPr>
+            <a:endParaRPr lang="de-DE" dirty="0"/>
+          </a:p>
+          <a:p>
+            <a:r>
+              <a:rPr lang="de-DE" u="sng" dirty="0"/>
+              <a:t>Lösungsansätze:</a:t>
+            </a:r>
+          </a:p>
+          <a:p>
+            <a:pPr marL="342900" indent="-342900">
+              <a:buFont typeface="+mj-lt"/>
+              <a:buAutoNum type="arabicPeriod"/>
+            </a:pPr>
+            <a:r>
+              <a:rPr lang="de-DE" u="sng" dirty="0"/>
+              <a:t>eine</a:t>
+            </a:r>
+            <a:r>
+              <a:rPr lang="de-DE" dirty="0"/>
+              <a:t> Datenbank (Großhändlerproduktdatenbank) mit </a:t>
+            </a:r>
+            <a:r>
+              <a:rPr lang="de-DE" dirty="0" err="1"/>
+              <a:t>boolean</a:t>
+            </a:r>
+            <a:r>
+              <a:rPr lang="de-DE" dirty="0"/>
+              <a:t> Wert</a:t>
+            </a:r>
+          </a:p>
+          <a:p>
+            <a:pPr marL="342900" indent="-342900">
+              <a:buFont typeface="+mj-lt"/>
+              <a:buAutoNum type="arabicPeriod"/>
+            </a:pPr>
+            <a:r>
+              <a:rPr lang="de-DE" u="sng" dirty="0"/>
+              <a:t>zwei</a:t>
+            </a:r>
+            <a:r>
+              <a:rPr lang="de-DE" dirty="0"/>
+              <a:t> Datenbanken (Großhändlerprodukte und angebotene Produkte getrennt)</a:t>
+            </a:r>
+          </a:p>
+        </p:txBody>
+      </p:sp>
+    </p:spTree>
+    <p:extLst>
+      <p:ext uri="{BB962C8B-B14F-4D97-AF65-F5344CB8AC3E}">
+        <p14:creationId xmlns:p14="http://schemas.microsoft.com/office/powerpoint/2010/main" val="4024101338"/>
+      </p:ext>
+    </p:extLst>
+  </p:cSld>
+  <p:clrMapOvr>
+    <a:masterClrMapping/>
+  </p:clrMapOvr>
+</p:sld>
+</file>
+
+<file path=ppt/slides/slide6.xml><?xml version="1.0" encoding="utf-8"?>
+<p:sld xmlns:a="http://schemas.openxmlformats.org/drawingml/2006/main" xmlns:r="http://schemas.openxmlformats.org/officeDocument/2006/relationships" xmlns:p="http://schemas.openxmlformats.org/presentationml/2006/main">
+  <p:cSld>
+    <p:spTree>
+      <p:nvGrpSpPr>
+        <p:cNvPr id="1" name=""/>
+        <p:cNvGrpSpPr/>
+        <p:nvPr/>
+      </p:nvGrpSpPr>
+      <p:grpSpPr>
+        <a:xfrm>
+          <a:off x="0" y="0"/>
+          <a:ext cx="0" cy="0"/>
+          <a:chOff x="0" y="0"/>
+          <a:chExt cx="0" cy="0"/>
+        </a:xfrm>
+      </p:grpSpPr>
+      <p:sp>
+        <p:nvSpPr>
+          <p:cNvPr id="2" name="Titel 1">
+            <a:extLst>
+              <a:ext uri="{FF2B5EF4-FFF2-40B4-BE49-F238E27FC236}">
+                <a16:creationId xmlns:a16="http://schemas.microsoft.com/office/drawing/2014/main" id="{47A7BB8D-DB90-4C12-A26A-3E193428521D}"/>
+              </a:ext>
+            </a:extLst>
+          </p:cNvPr>
+          <p:cNvSpPr>
+            <a:spLocks noGrp="1"/>
+          </p:cNvSpPr>
+          <p:nvPr>
+            <p:ph type="title"/>
+          </p:nvPr>
+        </p:nvSpPr>
+        <p:spPr/>
+        <p:txBody>
+          <a:bodyPr/>
+          <a:lstStyle/>
+          <a:p>
+            <a:r>
+              <a:rPr lang="de-DE" dirty="0"/>
+              <a:t>Probleme und Lösungsansätze</a:t>
+            </a:r>
+            <a:br>
+              <a:rPr lang="de-DE" dirty="0"/>
+            </a:br>
+            <a:r>
+              <a:rPr lang="de-DE" b="0" dirty="0"/>
+              <a:t>Problem 1</a:t>
+            </a:r>
+          </a:p>
+        </p:txBody>
+      </p:sp>
+      <p:sp>
+        <p:nvSpPr>
+          <p:cNvPr id="6" name="Inhaltsplatzhalter 5">
+            <a:extLst>
+              <a:ext uri="{FF2B5EF4-FFF2-40B4-BE49-F238E27FC236}">
+                <a16:creationId xmlns:a16="http://schemas.microsoft.com/office/drawing/2014/main" id="{2CBD6F4E-19E8-4ECD-A2F2-16B77AB2F32F}"/>
+              </a:ext>
+            </a:extLst>
+          </p:cNvPr>
+          <p:cNvSpPr>
+            <a:spLocks noGrp="1"/>
+          </p:cNvSpPr>
+          <p:nvPr>
+            <p:ph sz="quarter" idx="10"/>
+          </p:nvPr>
+        </p:nvSpPr>
+        <p:spPr/>
+        <p:txBody>
+          <a:bodyPr/>
+          <a:lstStyle/>
+          <a:p>
+            <a:r>
+              <a:rPr lang="de-DE" u="sng" dirty="0"/>
+              <a:t>Aufgabenstellung:</a:t>
+            </a:r>
+          </a:p>
+          <a:p>
+            <a:pPr marL="285750" indent="-285750">
+              <a:buFont typeface="Arial" panose="020B0604020202020204" pitchFamily="34" charset="0"/>
+              <a:buChar char="•"/>
+            </a:pPr>
+            <a:r>
+              <a:rPr lang="de-DE" dirty="0"/>
+              <a:t>Großhändlerproduktdatenbank kann bis zu 10.000 Artikel enthalten</a:t>
+            </a:r>
+          </a:p>
+          <a:p>
+            <a:pPr marL="285750" indent="-285750">
+              <a:buFont typeface="Arial" panose="020B0604020202020204" pitchFamily="34" charset="0"/>
+              <a:buChar char="•"/>
+            </a:pPr>
+            <a:r>
+              <a:rPr lang="de-DE" dirty="0"/>
+              <a:t>Angebotene Produktdatenbank kann maximal 999 Artikel beinhalten</a:t>
+            </a:r>
+          </a:p>
+          <a:p>
+            <a:pPr marL="285750" indent="-285750">
+              <a:buFont typeface="Arial" panose="020B0604020202020204" pitchFamily="34" charset="0"/>
+              <a:buChar char="•"/>
+            </a:pPr>
+            <a:endParaRPr lang="de-DE" dirty="0"/>
+          </a:p>
+          <a:p>
+            <a:r>
+              <a:rPr lang="de-DE" u="sng" dirty="0"/>
+              <a:t>Lösungsansätze:</a:t>
+            </a:r>
+          </a:p>
+          <a:p>
+            <a:pPr marL="342900" indent="-342900">
+              <a:buFont typeface="+mj-lt"/>
+              <a:buAutoNum type="arabicPeriod"/>
+            </a:pPr>
+            <a:r>
+              <a:rPr lang="de-DE" u="sng" dirty="0"/>
+              <a:t>eine</a:t>
+            </a:r>
+            <a:r>
+              <a:rPr lang="de-DE" dirty="0"/>
+              <a:t> Datenbank (Großhändlerproduktdatenbank) mit </a:t>
+            </a:r>
+            <a:r>
+              <a:rPr lang="de-DE" dirty="0" err="1"/>
+              <a:t>boolean</a:t>
+            </a:r>
+            <a:r>
+              <a:rPr lang="de-DE" dirty="0"/>
+              <a:t> Wert</a:t>
+            </a:r>
+          </a:p>
+          <a:p>
+            <a:pPr marL="342900" indent="-342900">
+              <a:buFont typeface="+mj-lt"/>
+              <a:buAutoNum type="arabicPeriod"/>
+            </a:pPr>
+            <a:r>
+              <a:rPr lang="de-DE" u="sng" dirty="0"/>
+              <a:t>zwei</a:t>
+            </a:r>
+            <a:r>
+              <a:rPr lang="de-DE" dirty="0"/>
+              <a:t> Datenbanken (Großhändlerprodukte und angebotene Produkte getrennt)</a:t>
+            </a:r>
+          </a:p>
+        </p:txBody>
+      </p:sp>
+      <p:cxnSp>
+        <p:nvCxnSpPr>
+          <p:cNvPr id="8" name="Gerader Verbinder 7">
+            <a:extLst>
+              <a:ext uri="{FF2B5EF4-FFF2-40B4-BE49-F238E27FC236}">
+                <a16:creationId xmlns:a16="http://schemas.microsoft.com/office/drawing/2014/main" id="{8F2B85BD-2B02-4D70-808A-9963B2411068}"/>
+              </a:ext>
+            </a:extLst>
+          </p:cNvPr>
+          <p:cNvCxnSpPr>
+            <a:cxnSpLocks/>
+          </p:cNvCxnSpPr>
+          <p:nvPr/>
+        </p:nvCxnSpPr>
+        <p:spPr>
+          <a:xfrm>
+            <a:off x="874711" y="3600821"/>
+            <a:ext cx="6840000" cy="0"/>
+          </a:xfrm>
+          <a:prstGeom prst="line">
+            <a:avLst/>
+          </a:prstGeom>
+          <a:ln w="22225"/>
+        </p:spPr>
+        <p:style>
+          <a:lnRef idx="1">
+            <a:schemeClr val="accent5"/>
+          </a:lnRef>
+          <a:fillRef idx="0">
+            <a:schemeClr val="accent5"/>
+          </a:fillRef>
+          <a:effectRef idx="0">
+            <a:schemeClr val="accent5"/>
+          </a:effectRef>
+          <a:fontRef idx="minor">
+            <a:schemeClr val="tx1"/>
+          </a:fontRef>
+        </p:style>
+      </p:cxnSp>
+    </p:spTree>
+    <p:extLst>
+      <p:ext uri="{BB962C8B-B14F-4D97-AF65-F5344CB8AC3E}">
+        <p14:creationId xmlns:p14="http://schemas.microsoft.com/office/powerpoint/2010/main" val="2841654269"/>
+      </p:ext>
+    </p:extLst>
+  </p:cSld>
+  <p:clrMapOvr>
+    <a:masterClrMapping/>
+  </p:clrMapOvr>
+  <p:timing>
+    <p:tnLst>
+      <p:par>
+        <p:cTn id="1" dur="indefinite" restart="never" nodeType="tmRoot">
+          <p:childTnLst>
+            <p:seq concurrent="1" nextAc="seek">
+              <p:cTn id="2" dur="indefinite" nodeType="mainSeq">
+                <p:childTnLst>
+                  <p:par>
+                    <p:cTn id="3" fill="hold">
+                      <p:stCondLst>
+                        <p:cond delay="indefinite"/>
+                      </p:stCondLst>
+                      <p:childTnLst>
+                        <p:par>
+                          <p:cTn id="4" fill="hold">
+                            <p:stCondLst>
+                              <p:cond delay="0"/>
+                            </p:stCondLst>
+                            <p:childTnLst>
+                              <p:par>
+                                <p:cTn id="5" presetID="53" presetClass="entr" presetSubtype="16" fill="hold" nodeType="clickEffect">
+                                  <p:stCondLst>
+                                    <p:cond delay="0"/>
+                                  </p:stCondLst>
+                                  <p:childTnLst>
+                                    <p:set>
+                                      <p:cBhvr>
+                                        <p:cTn id="6" dur="1" fill="hold">
+                                          <p:stCondLst>
+                                            <p:cond delay="0"/>
+                                          </p:stCondLst>
+                                        </p:cTn>
+                                        <p:tgtEl>
+                                          <p:spTgt spid="8"/>
+                                        </p:tgtEl>
+                                        <p:attrNameLst>
+                                          <p:attrName>style.visibility</p:attrName>
+                                        </p:attrNameLst>
+                                      </p:cBhvr>
+                                      <p:to>
+                                        <p:strVal val="visible"/>
+                                      </p:to>
+                                    </p:set>
+                                    <p:anim calcmode="lin" valueType="num">
+                                      <p:cBhvr>
+                                        <p:cTn id="7" dur="500" fill="hold"/>
+                                        <p:tgtEl>
+                                          <p:spTgt spid="8"/>
+                                        </p:tgtEl>
+                                        <p:attrNameLst>
+                                          <p:attrName>ppt_w</p:attrName>
+                                        </p:attrNameLst>
+                                      </p:cBhvr>
+                                      <p:tavLst>
+                                        <p:tav tm="0">
+                                          <p:val>
+                                            <p:fltVal val="0"/>
+                                          </p:val>
+                                        </p:tav>
+                                        <p:tav tm="100000">
+                                          <p:val>
+                                            <p:strVal val="#ppt_w"/>
+                                          </p:val>
+                                        </p:tav>
+                                      </p:tavLst>
+                                    </p:anim>
+                                    <p:anim calcmode="lin" valueType="num">
+                                      <p:cBhvr>
+                                        <p:cTn id="8" dur="500" fill="hold"/>
+                                        <p:tgtEl>
+                                          <p:spTgt spid="8"/>
+                                        </p:tgtEl>
+                                        <p:attrNameLst>
+                                          <p:attrName>ppt_h</p:attrName>
+                                        </p:attrNameLst>
+                                      </p:cBhvr>
+                                      <p:tavLst>
+                                        <p:tav tm="0">
+                                          <p:val>
+                                            <p:fltVal val="0"/>
+                                          </p:val>
+                                        </p:tav>
+                                        <p:tav tm="100000">
+                                          <p:val>
+                                            <p:strVal val="#ppt_h"/>
+                                          </p:val>
+                                        </p:tav>
+                                      </p:tavLst>
+                                    </p:anim>
+                                    <p:animEffect transition="in" filter="fade">
+                                      <p:cBhvr>
+                                        <p:cTn id="9" dur="500"/>
+                                        <p:tgtEl>
+                                          <p:spTgt spid="8"/>
+                                        </p:tgtEl>
+                                      </p:cBhvr>
+                                    </p:animEffect>
+                                  </p:childTnLst>
+                                </p:cTn>
+                              </p:par>
+                            </p:childTnLst>
+                          </p:cTn>
+                        </p:par>
+                      </p:childTnLst>
+                    </p:cTn>
+                  </p:par>
+                </p:childTnLst>
+              </p:cTn>
+              <p:prevCondLst>
+                <p:cond evt="onPrev" delay="0">
+                  <p:tgtEl>
+                    <p:sldTgt/>
+                  </p:tgtEl>
+                </p:cond>
+              </p:prevCondLst>
+              <p:nextCondLst>
+                <p:cond evt="onNext" delay="0">
+                  <p:tgtEl>
+                    <p:sldTgt/>
+                  </p:tgtEl>
+                </p:cond>
+              </p:nextCondLst>
+            </p:seq>
+          </p:childTnLst>
+        </p:cTn>
+      </p:par>
+    </p:tnLst>
+  </p:timing>
+</p:sld>
+</file>
+
+<file path=ppt/slides/slide7.xml><?xml version="1.0" encoding="utf-8"?>
+<p:sld xmlns:a="http://schemas.openxmlformats.org/drawingml/2006/main" xmlns:r="http://schemas.openxmlformats.org/officeDocument/2006/relationships" xmlns:p="http://schemas.openxmlformats.org/presentationml/2006/main">
+  <p:cSld>
+    <p:spTree>
+      <p:nvGrpSpPr>
+        <p:cNvPr id="1" name=""/>
+        <p:cNvGrpSpPr/>
+        <p:nvPr/>
+      </p:nvGrpSpPr>
+      <p:grpSpPr>
+        <a:xfrm>
+          <a:off x="0" y="0"/>
+          <a:ext cx="0" cy="0"/>
+          <a:chOff x="0" y="0"/>
+          <a:chExt cx="0" cy="0"/>
+        </a:xfrm>
+      </p:grpSpPr>
+      <p:sp>
+        <p:nvSpPr>
+          <p:cNvPr id="2" name="Titel 1">
+            <a:extLst>
+              <a:ext uri="{FF2B5EF4-FFF2-40B4-BE49-F238E27FC236}">
+                <a16:creationId xmlns:a16="http://schemas.microsoft.com/office/drawing/2014/main" id="{47A7BB8D-DB90-4C12-A26A-3E193428521D}"/>
+              </a:ext>
+            </a:extLst>
+          </p:cNvPr>
+          <p:cNvSpPr>
+            <a:spLocks noGrp="1"/>
+          </p:cNvSpPr>
+          <p:nvPr>
+            <p:ph type="title"/>
+          </p:nvPr>
+        </p:nvSpPr>
+        <p:spPr/>
+        <p:txBody>
+          <a:bodyPr/>
+          <a:lstStyle/>
+          <a:p>
+            <a:r>
+              <a:rPr lang="de-DE" dirty="0"/>
+              <a:t>Probleme und Lösungsansätze</a:t>
+            </a:r>
+            <a:br>
+              <a:rPr lang="de-DE" dirty="0"/>
+            </a:br>
+            <a:r>
+              <a:rPr lang="de-DE" b="0" dirty="0"/>
+              <a:t>Problem 1</a:t>
+            </a:r>
+          </a:p>
+        </p:txBody>
+      </p:sp>
+      <p:pic>
+        <p:nvPicPr>
+          <p:cNvPr id="7" name="Inhaltsplatzhalter 6">
+            <a:extLst>
+              <a:ext uri="{FF2B5EF4-FFF2-40B4-BE49-F238E27FC236}">
+                <a16:creationId xmlns:a16="http://schemas.microsoft.com/office/drawing/2014/main" id="{E64626F5-70DD-42D9-8D3B-321C467F4F9C}"/>
+              </a:ext>
+            </a:extLst>
+          </p:cNvPr>
+          <p:cNvPicPr>
+            <a:picLocks noGrp="1" noChangeAspect="1"/>
+          </p:cNvPicPr>
+          <p:nvPr>
+            <p:ph sz="quarter" idx="10"/>
+          </p:nvPr>
+        </p:nvPicPr>
+        <p:blipFill rotWithShape="1">
+          <a:blip r:embed="rId2">
+            <a:extLst>
+              <a:ext uri="{28A0092B-C50C-407E-A947-70E740481C1C}">
+                <a14:useLocalDpi xmlns:a14="http://schemas.microsoft.com/office/drawing/2010/main" val="0"/>
+              </a:ext>
+              <a:ext uri="{96DAC541-7B7A-43D3-8B79-37D633B846F1}">
+                <asvg:svgBlip xmlns:asvg="http://schemas.microsoft.com/office/drawing/2016/SVG/main" r:embed="rId3"/>
+              </a:ext>
+            </a:extLst>
+          </a:blip>
+          <a:srcRect b="15365"/>
+          <a:stretch/>
+        </p:blipFill>
+        <p:spPr>
+          <a:xfrm>
+            <a:off x="3515451" y="615297"/>
+            <a:ext cx="7801837" cy="5405241"/>
+          </a:xfrm>
+        </p:spPr>
+      </p:pic>
+      <p:pic>
+        <p:nvPicPr>
+          <p:cNvPr id="10" name="Grafik 9">
+            <a:extLst>
+              <a:ext uri="{FF2B5EF4-FFF2-40B4-BE49-F238E27FC236}">
+                <a16:creationId xmlns:a16="http://schemas.microsoft.com/office/drawing/2014/main" id="{44BBD020-BCBA-4082-861A-E103A607D279}"/>
+              </a:ext>
+            </a:extLst>
+          </p:cNvPr>
+          <p:cNvPicPr>
+            <a:picLocks noChangeAspect="1"/>
+          </p:cNvPicPr>
+          <p:nvPr/>
+        </p:nvPicPr>
+        <p:blipFill rotWithShape="1">
+          <a:blip r:embed="rId2">
+            <a:extLst>
+              <a:ext uri="{28A0092B-C50C-407E-A947-70E740481C1C}">
+                <a14:useLocalDpi xmlns:a14="http://schemas.microsoft.com/office/drawing/2010/main" val="0"/>
+              </a:ext>
+              <a:ext uri="{96DAC541-7B7A-43D3-8B79-37D633B846F1}">
+                <asvg:svgBlip xmlns:asvg="http://schemas.microsoft.com/office/drawing/2016/SVG/main" r:embed="rId3"/>
+              </a:ext>
+            </a:extLst>
+          </a:blip>
+          <a:srcRect l="37726" t="83365" r="37487"/>
+          <a:stretch/>
+        </p:blipFill>
+        <p:spPr>
+          <a:xfrm>
+            <a:off x="1068225" y="2858568"/>
+            <a:ext cx="2076628" cy="1140864"/>
+          </a:xfrm>
+          <a:prstGeom prst="rect">
+            <a:avLst/>
+          </a:prstGeom>
+        </p:spPr>
+      </p:pic>
+    </p:spTree>
+    <p:extLst>
+      <p:ext uri="{BB962C8B-B14F-4D97-AF65-F5344CB8AC3E}">
+        <p14:creationId xmlns:p14="http://schemas.microsoft.com/office/powerpoint/2010/main" val="2295263512"/>
+      </p:ext>
+    </p:extLst>
+  </p:cSld>
+  <p:clrMapOvr>
+    <a:masterClrMapping/>
+  </p:clrMapOvr>
+</p:sld>
+</file>
+
+<file path=ppt/slides/slide8.xml><?xml version="1.0" encoding="utf-8"?>
+<p:sld xmlns:a="http://schemas.openxmlformats.org/drawingml/2006/main" xmlns:r="http://schemas.openxmlformats.org/officeDocument/2006/relationships" xmlns:p="http://schemas.openxmlformats.org/presentationml/2006/main">
+  <p:cSld>
+    <p:spTree>
+      <p:nvGrpSpPr>
+        <p:cNvPr id="1" name=""/>
+        <p:cNvGrpSpPr/>
+        <p:nvPr/>
+      </p:nvGrpSpPr>
+      <p:grpSpPr>
+        <a:xfrm>
+          <a:off x="0" y="0"/>
+          <a:ext cx="0" cy="0"/>
+          <a:chOff x="0" y="0"/>
+          <a:chExt cx="0" cy="0"/>
+        </a:xfrm>
+      </p:grpSpPr>
+      <p:sp>
+        <p:nvSpPr>
+          <p:cNvPr id="2" name="Titel 1">
+            <a:extLst>
+              <a:ext uri="{FF2B5EF4-FFF2-40B4-BE49-F238E27FC236}">
+                <a16:creationId xmlns:a16="http://schemas.microsoft.com/office/drawing/2014/main" id="{47A7BB8D-DB90-4C12-A26A-3E193428521D}"/>
+              </a:ext>
+            </a:extLst>
+          </p:cNvPr>
+          <p:cNvSpPr>
+            <a:spLocks noGrp="1"/>
+          </p:cNvSpPr>
+          <p:nvPr>
+            <p:ph type="title"/>
+          </p:nvPr>
+        </p:nvSpPr>
+        <p:spPr/>
+        <p:txBody>
+          <a:bodyPr/>
+          <a:lstStyle/>
+          <a:p>
+            <a:r>
+              <a:rPr lang="de-DE" dirty="0"/>
+              <a:t>Probleme und Lösungsansätze</a:t>
+            </a:r>
+            <a:br>
+              <a:rPr lang="de-DE" dirty="0"/>
+            </a:br>
+            <a:r>
+              <a:rPr lang="de-DE" b="0" dirty="0"/>
+              <a:t>Problem 1</a:t>
+            </a:r>
+          </a:p>
+        </p:txBody>
+      </p:sp>
+      <p:pic>
+        <p:nvPicPr>
+          <p:cNvPr id="7" name="Inhaltsplatzhalter 6">
+            <a:extLst>
+              <a:ext uri="{FF2B5EF4-FFF2-40B4-BE49-F238E27FC236}">
+                <a16:creationId xmlns:a16="http://schemas.microsoft.com/office/drawing/2014/main" id="{E64626F5-70DD-42D9-8D3B-321C467F4F9C}"/>
+              </a:ext>
+            </a:extLst>
+          </p:cNvPr>
+          <p:cNvPicPr>
+            <a:picLocks noGrp="1" noChangeAspect="1"/>
+          </p:cNvPicPr>
+          <p:nvPr>
+            <p:ph sz="quarter" idx="10"/>
+          </p:nvPr>
+        </p:nvPicPr>
+        <p:blipFill rotWithShape="1">
+          <a:blip r:embed="rId2">
+            <a:extLst>
+              <a:ext uri="{28A0092B-C50C-407E-A947-70E740481C1C}">
+                <a14:useLocalDpi xmlns:a14="http://schemas.microsoft.com/office/drawing/2010/main" val="0"/>
+              </a:ext>
+              <a:ext uri="{96DAC541-7B7A-43D3-8B79-37D633B846F1}">
+                <asvg:svgBlip xmlns:asvg="http://schemas.microsoft.com/office/drawing/2016/SVG/main" r:embed="rId3"/>
+              </a:ext>
+            </a:extLst>
+          </a:blip>
+          <a:srcRect b="15365"/>
+          <a:stretch/>
+        </p:blipFill>
+        <p:spPr>
+          <a:xfrm>
+            <a:off x="3515451" y="615297"/>
+            <a:ext cx="7801837" cy="5405241"/>
+          </a:xfrm>
+        </p:spPr>
+      </p:pic>
+      <p:pic>
+        <p:nvPicPr>
+          <p:cNvPr id="10" name="Grafik 9">
+            <a:extLst>
+              <a:ext uri="{FF2B5EF4-FFF2-40B4-BE49-F238E27FC236}">
+                <a16:creationId xmlns:a16="http://schemas.microsoft.com/office/drawing/2014/main" id="{44BBD020-BCBA-4082-861A-E103A607D279}"/>
+              </a:ext>
+            </a:extLst>
+          </p:cNvPr>
+          <p:cNvPicPr>
+            <a:picLocks noChangeAspect="1"/>
+          </p:cNvPicPr>
+          <p:nvPr/>
+        </p:nvPicPr>
+        <p:blipFill rotWithShape="1">
+          <a:blip r:embed="rId2">
+            <a:extLst>
+              <a:ext uri="{28A0092B-C50C-407E-A947-70E740481C1C}">
+                <a14:useLocalDpi xmlns:a14="http://schemas.microsoft.com/office/drawing/2010/main" val="0"/>
+              </a:ext>
+              <a:ext uri="{96DAC541-7B7A-43D3-8B79-37D633B846F1}">
+                <asvg:svgBlip xmlns:asvg="http://schemas.microsoft.com/office/drawing/2016/SVG/main" r:embed="rId3"/>
+              </a:ext>
+            </a:extLst>
+          </a:blip>
+          <a:srcRect l="37726" t="83365" r="37487"/>
+          <a:stretch/>
+        </p:blipFill>
+        <p:spPr>
+          <a:xfrm>
+            <a:off x="1068225" y="2858568"/>
+            <a:ext cx="2076628" cy="1140864"/>
+          </a:xfrm>
+          <a:prstGeom prst="rect">
+            <a:avLst/>
+          </a:prstGeom>
+        </p:spPr>
+      </p:pic>
+      <p:sp>
+        <p:nvSpPr>
+          <p:cNvPr id="3" name="Rechteck: abgerundete Ecken 2">
+            <a:extLst>
+              <a:ext uri="{FF2B5EF4-FFF2-40B4-BE49-F238E27FC236}">
+                <a16:creationId xmlns:a16="http://schemas.microsoft.com/office/drawing/2014/main" id="{B5C4EC8C-E1D0-4A11-B7E0-6930B8503330}"/>
+              </a:ext>
+            </a:extLst>
+          </p:cNvPr>
+          <p:cNvSpPr/>
+          <p:nvPr/>
+        </p:nvSpPr>
+        <p:spPr>
+          <a:xfrm>
+            <a:off x="6494804" y="3751604"/>
+            <a:ext cx="2589375" cy="1213503"/>
+          </a:xfrm>
+          <a:prstGeom prst="roundRect">
+            <a:avLst/>
+          </a:prstGeom>
+          <a:noFill/>
+          <a:ln w="38100" cap="flat" cmpd="sng" algn="ctr">
+            <a:solidFill>
+              <a:schemeClr val="accent5"/>
+            </a:solidFill>
+            <a:prstDash val="solid"/>
+            <a:round/>
+            <a:headEnd type="none" w="med" len="med"/>
+            <a:tailEnd type="none" w="med" len="med"/>
+          </a:ln>
+        </p:spPr>
+        <p:style>
+          <a:lnRef idx="0">
+            <a:scrgbClr r="0" g="0" b="0"/>
+          </a:lnRef>
+          <a:fillRef idx="0">
+            <a:scrgbClr r="0" g="0" b="0"/>
+          </a:fillRef>
+          <a:effectRef idx="0">
+            <a:scrgbClr r="0" g="0" b="0"/>
+          </a:effectRef>
+          <a:fontRef idx="minor">
+            <a:schemeClr val="accent5"/>
+          </a:fontRef>
+        </p:style>
+        <p:txBody>
+          <a:bodyPr rtlCol="0" anchor="ctr"/>
+          <a:lstStyle/>
+          <a:p>
+            <a:pPr algn="ctr"/>
+            <a:endParaRPr lang="de-DE"/>
+          </a:p>
+        </p:txBody>
+      </p:sp>
+      <p:sp>
+        <p:nvSpPr>
+          <p:cNvPr id="6" name="Rechteck: abgerundete Ecken 5">
+            <a:extLst>
+              <a:ext uri="{FF2B5EF4-FFF2-40B4-BE49-F238E27FC236}">
+                <a16:creationId xmlns:a16="http://schemas.microsoft.com/office/drawing/2014/main" id="{C2EE6A62-E051-4D5F-84DB-B47B23119A88}"/>
+              </a:ext>
+            </a:extLst>
+          </p:cNvPr>
+          <p:cNvSpPr/>
+          <p:nvPr/>
+        </p:nvSpPr>
+        <p:spPr>
+          <a:xfrm>
+            <a:off x="8947447" y="2213361"/>
+            <a:ext cx="2201966" cy="1350235"/>
+          </a:xfrm>
+          <a:prstGeom prst="roundRect">
+            <a:avLst/>
+          </a:prstGeom>
+          <a:noFill/>
+          <a:ln w="38100" cap="flat" cmpd="sng" algn="ctr">
+            <a:solidFill>
+              <a:schemeClr val="accent5"/>
+            </a:solidFill>
+            <a:prstDash val="solid"/>
+            <a:round/>
+            <a:headEnd type="none" w="med" len="med"/>
+            <a:tailEnd type="none" w="med" len="med"/>
+          </a:ln>
+        </p:spPr>
+        <p:style>
+          <a:lnRef idx="0">
+            <a:scrgbClr r="0" g="0" b="0"/>
+          </a:lnRef>
+          <a:fillRef idx="0">
+            <a:scrgbClr r="0" g="0" b="0"/>
+          </a:fillRef>
+          <a:effectRef idx="0">
+            <a:scrgbClr r="0" g="0" b="0"/>
+          </a:effectRef>
+          <a:fontRef idx="minor">
+            <a:schemeClr val="accent5"/>
+          </a:fontRef>
+        </p:style>
+        <p:txBody>
+          <a:bodyPr rtlCol="0" anchor="ctr"/>
+          <a:lstStyle/>
+          <a:p>
+            <a:pPr algn="ctr"/>
+            <a:endParaRPr lang="de-DE"/>
+          </a:p>
+        </p:txBody>
+      </p:sp>
+    </p:spTree>
+    <p:extLst>
+      <p:ext uri="{BB962C8B-B14F-4D97-AF65-F5344CB8AC3E}">
+        <p14:creationId xmlns:p14="http://schemas.microsoft.com/office/powerpoint/2010/main" val="4176933626"/>
+      </p:ext>
+    </p:extLst>
+  </p:cSld>
+  <p:clrMapOvr>
+    <a:masterClrMapping/>
+  </p:clrMapOvr>
+</p:sld>
+</file>
+
+<file path=ppt/slides/slide9.xml><?xml version="1.0" encoding="utf-8"?>
+<p:sld xmlns:a="http://schemas.openxmlformats.org/drawingml/2006/main" xmlns:r="http://schemas.openxmlformats.org/officeDocument/2006/relationships" xmlns:p="http://schemas.openxmlformats.org/presentationml/2006/main">
+  <p:cSld>
+    <p:spTree>
+      <p:nvGrpSpPr>
+        <p:cNvPr id="1" name=""/>
+        <p:cNvGrpSpPr/>
+        <p:nvPr/>
+      </p:nvGrpSpPr>
+      <p:grpSpPr>
+        <a:xfrm>
+          <a:off x="0" y="0"/>
+          <a:ext cx="0" cy="0"/>
+          <a:chOff x="0" y="0"/>
+          <a:chExt cx="0" cy="0"/>
+        </a:xfrm>
+      </p:grpSpPr>
+      <p:sp>
+        <p:nvSpPr>
+          <p:cNvPr id="2" name="Titel 1">
+            <a:extLst>
+              <a:ext uri="{FF2B5EF4-FFF2-40B4-BE49-F238E27FC236}">
+                <a16:creationId xmlns:a16="http://schemas.microsoft.com/office/drawing/2014/main" id="{9A412E5E-34B8-4161-B351-6932A0625BA2}"/>
+              </a:ext>
+            </a:extLst>
+          </p:cNvPr>
+          <p:cNvSpPr>
+            <a:spLocks noGrp="1"/>
+          </p:cNvSpPr>
+          <p:nvPr>
+            <p:ph type="title"/>
+          </p:nvPr>
+        </p:nvSpPr>
+        <p:spPr/>
+        <p:txBody>
+          <a:bodyPr/>
+          <a:lstStyle/>
+          <a:p>
+            <a:r>
+              <a:rPr lang="de-DE" dirty="0"/>
+              <a:t>Probleme und Lösungsansätze</a:t>
+            </a:r>
+            <a:br>
+              <a:rPr lang="de-DE" dirty="0"/>
+            </a:br>
+            <a:r>
+              <a:rPr lang="de-DE" b="0" dirty="0"/>
+              <a:t>Problem 2</a:t>
+            </a:r>
+          </a:p>
+        </p:txBody>
+      </p:sp>
+      <p:sp>
+        <p:nvSpPr>
+          <p:cNvPr id="3" name="Inhaltsplatzhalter 2">
+            <a:extLst>
+              <a:ext uri="{FF2B5EF4-FFF2-40B4-BE49-F238E27FC236}">
+                <a16:creationId xmlns:a16="http://schemas.microsoft.com/office/drawing/2014/main" id="{FCF4E8FF-213C-49C5-B5E4-86B00FF71ED0}"/>
+              </a:ext>
+            </a:extLst>
+          </p:cNvPr>
+          <p:cNvSpPr>
+            <a:spLocks noGrp="1"/>
+          </p:cNvSpPr>
+          <p:nvPr>
+            <p:ph sz="quarter" idx="10"/>
+          </p:nvPr>
+        </p:nvSpPr>
+        <p:spPr/>
+        <p:txBody>
+          <a:bodyPr/>
+          <a:lstStyle/>
+          <a:p>
+            <a:r>
+              <a:rPr lang="de-DE" u="sng" dirty="0"/>
+              <a:t>Aufgabenstellung:</a:t>
+            </a:r>
+          </a:p>
+          <a:p>
+            <a:pPr marL="285750" indent="-285750">
+              <a:buFont typeface="Arial" panose="020B0604020202020204" pitchFamily="34" charset="0"/>
+              <a:buChar char="•"/>
+            </a:pPr>
+            <a:r>
+              <a:rPr lang="de-DE" dirty="0"/>
+              <a:t>Kunden sollen keine Login-Daten besitzen (nur Personal und Manager)</a:t>
+            </a:r>
+          </a:p>
+          <a:p>
+            <a:pPr marL="285750" indent="-285750">
+              <a:buFont typeface="Arial" panose="020B0604020202020204" pitchFamily="34" charset="0"/>
+              <a:buChar char="•"/>
+            </a:pPr>
+            <a:r>
+              <a:rPr lang="de-DE" dirty="0"/>
+              <a:t>Manager und Personal besitzen unterschiedliche Zugriffe</a:t>
+            </a:r>
+          </a:p>
+          <a:p>
+            <a:endParaRPr lang="de-DE" dirty="0"/>
+          </a:p>
+          <a:p>
+            <a:r>
+              <a:rPr lang="de-DE" u="sng" dirty="0"/>
+              <a:t>Lösungsansatz:</a:t>
+            </a:r>
+          </a:p>
+          <a:p>
+            <a:pPr marL="285750" indent="-285750">
+              <a:buFont typeface="Arial" panose="020B0604020202020204" pitchFamily="34" charset="0"/>
+              <a:buChar char="•"/>
+            </a:pPr>
+            <a:r>
+              <a:rPr lang="de-DE" dirty="0"/>
+              <a:t>Customer und User werden getrennt </a:t>
+            </a:r>
+          </a:p>
+          <a:p>
+            <a:pPr marL="285750" indent="-285750">
+              <a:buFont typeface="Arial" panose="020B0604020202020204" pitchFamily="34" charset="0"/>
+              <a:buChar char="•"/>
+            </a:pPr>
+            <a:r>
+              <a:rPr lang="de-DE" dirty="0"/>
+              <a:t>User bekommen Rollen für Permission System</a:t>
+            </a:r>
+          </a:p>
+          <a:p>
+            <a:endParaRPr lang="de-DE" dirty="0"/>
+          </a:p>
+        </p:txBody>
+      </p:sp>
+    </p:spTree>
+    <p:extLst>
+      <p:ext uri="{BB962C8B-B14F-4D97-AF65-F5344CB8AC3E}">
+        <p14:creationId xmlns:p14="http://schemas.microsoft.com/office/powerpoint/2010/main" val="924803363"/>
       </p:ext>
     </p:extLst>
   </p:cSld>

</xml_diff>